<commit_message>
InsertNewSlide function finished and working for single content fields. -> Multi content functionality missing.
</commit_message>
<xml_diff>
--- a/ChangeQueryExport/Plugins/PPTXExportPlugin_Template.pptx
+++ b/ChangeQueryExport/Plugins/PPTXExportPlugin_Template.pptx
@@ -1,15 +1,12 @@
 
 <file path=ppt/presentation.xml><?xml version="1.0" encoding="utf-8"?>
-<p:presentation xmlns:p15="http://schemas.microsoft.com/office/powerpoint/2012/main" xmlns:a="http://schemas.openxmlformats.org/drawingml/2006/main" xmlns:r="http://schemas.openxmlformats.org/officeDocument/2006/relationships" xmlns:p="http://schemas.openxmlformats.org/presentationml/2006/main" saveSubsetFonts="1">
+<p:presentation xmlns:a="http://schemas.openxmlformats.org/drawingml/2006/main" xmlns:r="http://schemas.openxmlformats.org/officeDocument/2006/relationships" xmlns:p="http://schemas.openxmlformats.org/presentationml/2006/main" saveSubsetFonts="1">
   <p:sldMasterIdLst>
     <p:sldMasterId id="2147483648" r:id="rId1"/>
   </p:sldMasterIdLst>
   <p:sldIdLst>
     <p:sldId id="256" r:id="rId2"/>
-    <p:sldId id="260" r:id="Rd9e015eda90d4797"/>
-    <p:sldId id="259" r:id="Rfe79c12cef7f4744"/>
     <p:sldId id="257" r:id="rId3"/>
-    <p:sldId id="258" r:id="rId4"/>
   </p:sldIdLst>
   <p:sldSz cx="12192000" cy="6858000"/>
   <p:notesSz cx="6858000" cy="9144000"/>
@@ -116,9 +113,92 @@
 </p:presentation>
 </file>
 
+<file path=ppt/revisionInfo.xml><?xml version="1.0" encoding="utf-8"?>
+<p1510:revInfo xmlns:a="http://schemas.openxmlformats.org/drawingml/2006/main" xmlns:r="http://schemas.openxmlformats.org/officeDocument/2006/relationships" xmlns:p1510="http://schemas.microsoft.com/office/powerpoint/2015/10/main">
+  <p1510:revLst>
+    <p1510:client id="{51F26BDF-D629-4015-B29E-5A7861C6EA77}" v="1" dt="2023-12-07T10:22:31.043"/>
+  </p1510:revLst>
+</p1510:revInfo>
+</file>
+
+<file path=ppt/changesInfos/changesInfo1.xml><?xml version="1.0" encoding="utf-8"?>
+<pc:chgInfo xmlns:a="http://schemas.openxmlformats.org/drawingml/2006/main" xmlns:r="http://schemas.openxmlformats.org/officeDocument/2006/relationships" xmlns:ac="http://schemas.microsoft.com/office/drawing/2013/main/command" xmlns:pc="http://schemas.microsoft.com/office/powerpoint/2013/main/command">
+  <pc:docChgLst>
+    <pc:chgData name="René Hézser" userId="075ca10c-2324-418b-95c3-dc3b16ab1077" providerId="ADAL" clId="{51F26BDF-D629-4015-B29E-5A7861C6EA77}"/>
+    <pc:docChg chg="custSel addSld modSld">
+      <pc:chgData name="René Hézser" userId="075ca10c-2324-418b-95c3-dc3b16ab1077" providerId="ADAL" clId="{51F26BDF-D629-4015-B29E-5A7861C6EA77}" dt="2023-12-07T10:23:17.242" v="5" actId="9405"/>
+      <pc:docMkLst>
+        <pc:docMk/>
+      </pc:docMkLst>
+      <pc:sldChg chg="modSp mod">
+        <pc:chgData name="René Hézser" userId="075ca10c-2324-418b-95c3-dc3b16ab1077" providerId="ADAL" clId="{51F26BDF-D629-4015-B29E-5A7861C6EA77}" dt="2023-12-07T10:22:31.705" v="1" actId="27636"/>
+        <pc:sldMkLst>
+          <pc:docMk/>
+          <pc:sldMk cId="0" sldId="260"/>
+        </pc:sldMkLst>
+        <pc:spChg chg="mod">
+          <ac:chgData name="René Hézser" userId="075ca10c-2324-418b-95c3-dc3b16ab1077" providerId="ADAL" clId="{51F26BDF-D629-4015-B29E-5A7861C6EA77}" dt="2023-12-07T10:22:31.705" v="1" actId="27636"/>
+          <ac:spMkLst>
+            <pc:docMk/>
+            <pc:sldMk cId="0" sldId="260"/>
+            <ac:spMk id="3" creationId="{00000000-0000-0000-0000-000000000000}"/>
+          </ac:spMkLst>
+        </pc:spChg>
+      </pc:sldChg>
+      <pc:sldChg chg="modSp mod">
+        <pc:chgData name="René Hézser" userId="075ca10c-2324-418b-95c3-dc3b16ab1077" providerId="ADAL" clId="{51F26BDF-D629-4015-B29E-5A7861C6EA77}" dt="2023-12-07T10:22:32.324" v="2" actId="27636"/>
+        <pc:sldMkLst>
+          <pc:docMk/>
+          <pc:sldMk cId="0" sldId="263"/>
+        </pc:sldMkLst>
+        <pc:spChg chg="mod">
+          <ac:chgData name="René Hézser" userId="075ca10c-2324-418b-95c3-dc3b16ab1077" providerId="ADAL" clId="{51F26BDF-D629-4015-B29E-5A7861C6EA77}" dt="2023-12-07T10:22:32.324" v="2" actId="27636"/>
+          <ac:spMkLst>
+            <pc:docMk/>
+            <pc:sldMk cId="0" sldId="263"/>
+            <ac:spMk id="3" creationId="{00000000-0000-0000-0000-000000000000}"/>
+          </ac:spMkLst>
+        </pc:spChg>
+      </pc:sldChg>
+      <pc:sldChg chg="addSp add mod">
+        <pc:chgData name="René Hézser" userId="075ca10c-2324-418b-95c3-dc3b16ab1077" providerId="ADAL" clId="{51F26BDF-D629-4015-B29E-5A7861C6EA77}" dt="2023-12-07T10:23:17.242" v="5" actId="9405"/>
+        <pc:sldMkLst>
+          <pc:docMk/>
+          <pc:sldMk cId="3908001472" sldId="2147470040"/>
+        </pc:sldMkLst>
+        <pc:inkChg chg="add">
+          <ac:chgData name="René Hézser" userId="075ca10c-2324-418b-95c3-dc3b16ab1077" providerId="ADAL" clId="{51F26BDF-D629-4015-B29E-5A7861C6EA77}" dt="2023-12-07T10:23:00.754" v="3" actId="9405"/>
+          <ac:inkMkLst>
+            <pc:docMk/>
+            <pc:sldMk cId="3908001472" sldId="2147470040"/>
+            <ac:inkMk id="2" creationId="{67A08CC4-ECD0-1567-29CF-4295DE54F78E}"/>
+          </ac:inkMkLst>
+        </pc:inkChg>
+        <pc:inkChg chg="add">
+          <ac:chgData name="René Hézser" userId="075ca10c-2324-418b-95c3-dc3b16ab1077" providerId="ADAL" clId="{51F26BDF-D629-4015-B29E-5A7861C6EA77}" dt="2023-12-07T10:23:03.803" v="4" actId="9405"/>
+          <ac:inkMkLst>
+            <pc:docMk/>
+            <pc:sldMk cId="3908001472" sldId="2147470040"/>
+            <ac:inkMk id="4" creationId="{1CA496EF-F094-3969-CB02-B9D7ACCB1953}"/>
+          </ac:inkMkLst>
+        </pc:inkChg>
+        <pc:inkChg chg="add">
+          <ac:chgData name="René Hézser" userId="075ca10c-2324-418b-95c3-dc3b16ab1077" providerId="ADAL" clId="{51F26BDF-D629-4015-B29E-5A7861C6EA77}" dt="2023-12-07T10:23:17.242" v="5" actId="9405"/>
+          <ac:inkMkLst>
+            <pc:docMk/>
+            <pc:sldMk cId="3908001472" sldId="2147470040"/>
+            <ac:inkMk id="5" creationId="{A12FF37D-043F-25DE-ADE6-2BBB05F44F39}"/>
+          </ac:inkMkLst>
+        </pc:inkChg>
+      </pc:sldChg>
+    </pc:docChg>
+  </pc:docChgLst>
+</pc:chgInfo>
+</file>
+
 <file path=ppt/slideLayouts/slideLayout1.xml><?xml version="1.0" encoding="utf-8"?>
-<p:sldLayout xmlns:a16="http://schemas.microsoft.com/office/drawing/2014/main" xmlns:p14="http://schemas.microsoft.com/office/powerpoint/2010/main" xmlns:a="http://schemas.openxmlformats.org/drawingml/2006/main" xmlns:r="http://schemas.openxmlformats.org/officeDocument/2006/relationships" xmlns:p="http://schemas.openxmlformats.org/presentationml/2006/main" type="obj" preserve="1">
-  <p:cSld name="Titel und Inhalt">
+<p:sldLayout xmlns:a="http://schemas.openxmlformats.org/drawingml/2006/main" xmlns:r="http://schemas.openxmlformats.org/officeDocument/2006/relationships" xmlns:p="http://schemas.openxmlformats.org/presentationml/2006/main" preserve="1" userDrawn="1">
+  <p:cSld name="Title">
     <p:spTree>
       <p:nvGrpSpPr>
         <p:cNvPr id="1" name=""/>
@@ -135,10 +215,278 @@
       </p:grpSpPr>
       <p:sp>
         <p:nvSpPr>
+          <p:cNvPr id="12" name="Freihandform: Form 11">
+            <a:extLst>
+              <a:ext uri="{FF2B5EF4-FFF2-40B4-BE49-F238E27FC236}">
+                <a16:creationId xmlns:a16="http://schemas.microsoft.com/office/drawing/2014/main" id="{2D89E5E3-0188-BB1C-0A32-D9C6077FDDB7}"/>
+              </a:ext>
+            </a:extLst>
+          </p:cNvPr>
+          <p:cNvSpPr/>
+          <p:nvPr userDrawn="1"/>
+        </p:nvSpPr>
+        <p:spPr>
+          <a:xfrm>
+            <a:off x="0" y="0"/>
+            <a:ext cx="12192000" cy="6857999"/>
+          </a:xfrm>
+          <a:custGeom>
+            <a:avLst/>
+            <a:gdLst>
+              <a:gd name="connsiteX0" fmla="*/ 10570899 w 12192000"/>
+              <a:gd name="connsiteY0" fmla="*/ 3864875 h 6857999"/>
+              <a:gd name="connsiteX1" fmla="*/ 10582514 w 12192000"/>
+              <a:gd name="connsiteY1" fmla="*/ 3871937 h 6857999"/>
+              <a:gd name="connsiteX2" fmla="*/ 10570899 w 12192000"/>
+              <a:gd name="connsiteY2" fmla="*/ 3874276 h 6857999"/>
+              <a:gd name="connsiteX3" fmla="*/ 9630112 w 12192000"/>
+              <a:gd name="connsiteY3" fmla="*/ 3292863 h 6857999"/>
+              <a:gd name="connsiteX4" fmla="*/ 9630112 w 12192000"/>
+              <a:gd name="connsiteY4" fmla="*/ 3672828 h 6857999"/>
+              <a:gd name="connsiteX5" fmla="*/ 8755694 w 12192000"/>
+              <a:gd name="connsiteY5" fmla="*/ 3930010 h 6857999"/>
+              <a:gd name="connsiteX6" fmla="*/ 8493535 w 12192000"/>
+              <a:gd name="connsiteY6" fmla="*/ 4266835 h 6857999"/>
+              <a:gd name="connsiteX7" fmla="*/ 8493535 w 12192000"/>
+              <a:gd name="connsiteY7" fmla="*/ 5031743 h 6857999"/>
+              <a:gd name="connsiteX8" fmla="*/ 8868523 w 12192000"/>
+              <a:gd name="connsiteY8" fmla="*/ 5197667 h 6857999"/>
+              <a:gd name="connsiteX9" fmla="*/ 8868523 w 12192000"/>
+              <a:gd name="connsiteY9" fmla="*/ 4217058 h 6857999"/>
+              <a:gd name="connsiteX10" fmla="*/ 10570899 w 12192000"/>
+              <a:gd name="connsiteY10" fmla="*/ 3874276 h 6857999"/>
+              <a:gd name="connsiteX11" fmla="*/ 10570899 w 12192000"/>
+              <a:gd name="connsiteY11" fmla="*/ 5318791 h 6857999"/>
+              <a:gd name="connsiteX12" fmla="*/ 8873500 w 12192000"/>
+              <a:gd name="connsiteY12" fmla="*/ 5186052 h 6857999"/>
+              <a:gd name="connsiteX13" fmla="*/ 9455892 w 12192000"/>
+              <a:gd name="connsiteY13" fmla="*/ 5947642 h 6857999"/>
+              <a:gd name="connsiteX14" fmla="*/ 9455892 w 12192000"/>
+              <a:gd name="connsiteY14" fmla="*/ 5575973 h 6857999"/>
+              <a:gd name="connsiteX15" fmla="*/ 10484619 w 12192000"/>
+              <a:gd name="connsiteY15" fmla="*/ 5950960 h 6857999"/>
+              <a:gd name="connsiteX16" fmla="*/ 11148314 w 12192000"/>
+              <a:gd name="connsiteY16" fmla="*/ 5406731 h 6857999"/>
+              <a:gd name="connsiteX17" fmla="*/ 11148314 w 12192000"/>
+              <a:gd name="connsiteY17" fmla="*/ 3790634 h 6857999"/>
+              <a:gd name="connsiteX18" fmla="*/ 10570899 w 12192000"/>
+              <a:gd name="connsiteY18" fmla="*/ 3863640 h 6857999"/>
+              <a:gd name="connsiteX19" fmla="*/ 10570899 w 12192000"/>
+              <a:gd name="connsiteY19" fmla="*/ 3864875 h 6857999"/>
+              <a:gd name="connsiteX20" fmla="*/ 0 w 12192000"/>
+              <a:gd name="connsiteY20" fmla="*/ 0 h 6857999"/>
+              <a:gd name="connsiteX21" fmla="*/ 12192000 w 12192000"/>
+              <a:gd name="connsiteY21" fmla="*/ 0 h 6857999"/>
+              <a:gd name="connsiteX22" fmla="*/ 12192000 w 12192000"/>
+              <a:gd name="connsiteY22" fmla="*/ 6857999 h 6857999"/>
+              <a:gd name="connsiteX23" fmla="*/ 0 w 12192000"/>
+              <a:gd name="connsiteY23" fmla="*/ 6857999 h 6857999"/>
+            </a:gdLst>
+            <a:ahLst/>
+            <a:cxnLst>
+              <a:cxn ang="0">
+                <a:pos x="connsiteX0" y="connsiteY0"/>
+              </a:cxn>
+              <a:cxn ang="0">
+                <a:pos x="connsiteX1" y="connsiteY1"/>
+              </a:cxn>
+              <a:cxn ang="0">
+                <a:pos x="connsiteX2" y="connsiteY2"/>
+              </a:cxn>
+              <a:cxn ang="0">
+                <a:pos x="connsiteX3" y="connsiteY3"/>
+              </a:cxn>
+              <a:cxn ang="0">
+                <a:pos x="connsiteX4" y="connsiteY4"/>
+              </a:cxn>
+              <a:cxn ang="0">
+                <a:pos x="connsiteX5" y="connsiteY5"/>
+              </a:cxn>
+              <a:cxn ang="0">
+                <a:pos x="connsiteX6" y="connsiteY6"/>
+              </a:cxn>
+              <a:cxn ang="0">
+                <a:pos x="connsiteX7" y="connsiteY7"/>
+              </a:cxn>
+              <a:cxn ang="0">
+                <a:pos x="connsiteX8" y="connsiteY8"/>
+              </a:cxn>
+              <a:cxn ang="0">
+                <a:pos x="connsiteX9" y="connsiteY9"/>
+              </a:cxn>
+              <a:cxn ang="0">
+                <a:pos x="connsiteX10" y="connsiteY10"/>
+              </a:cxn>
+              <a:cxn ang="0">
+                <a:pos x="connsiteX11" y="connsiteY11"/>
+              </a:cxn>
+              <a:cxn ang="0">
+                <a:pos x="connsiteX12" y="connsiteY12"/>
+              </a:cxn>
+              <a:cxn ang="0">
+                <a:pos x="connsiteX13" y="connsiteY13"/>
+              </a:cxn>
+              <a:cxn ang="0">
+                <a:pos x="connsiteX14" y="connsiteY14"/>
+              </a:cxn>
+              <a:cxn ang="0">
+                <a:pos x="connsiteX15" y="connsiteY15"/>
+              </a:cxn>
+              <a:cxn ang="0">
+                <a:pos x="connsiteX16" y="connsiteY16"/>
+              </a:cxn>
+              <a:cxn ang="0">
+                <a:pos x="connsiteX17" y="connsiteY17"/>
+              </a:cxn>
+              <a:cxn ang="0">
+                <a:pos x="connsiteX18" y="connsiteY18"/>
+              </a:cxn>
+              <a:cxn ang="0">
+                <a:pos x="connsiteX19" y="connsiteY19"/>
+              </a:cxn>
+              <a:cxn ang="0">
+                <a:pos x="connsiteX20" y="connsiteY20"/>
+              </a:cxn>
+              <a:cxn ang="0">
+                <a:pos x="connsiteX21" y="connsiteY21"/>
+              </a:cxn>
+              <a:cxn ang="0">
+                <a:pos x="connsiteX22" y="connsiteY22"/>
+              </a:cxn>
+              <a:cxn ang="0">
+                <a:pos x="connsiteX23" y="connsiteY23"/>
+              </a:cxn>
+            </a:cxnLst>
+            <a:rect l="l" t="t" r="r" b="b"/>
+            <a:pathLst>
+              <a:path w="12192000" h="6857999">
+                <a:moveTo>
+                  <a:pt x="10570899" y="3864875"/>
+                </a:moveTo>
+                <a:lnTo>
+                  <a:pt x="10582514" y="3871937"/>
+                </a:lnTo>
+                <a:lnTo>
+                  <a:pt x="10570899" y="3874276"/>
+                </a:lnTo>
+                <a:close/>
+                <a:moveTo>
+                  <a:pt x="9630112" y="3292863"/>
+                </a:moveTo>
+                <a:lnTo>
+                  <a:pt x="9630112" y="3672828"/>
+                </a:lnTo>
+                <a:lnTo>
+                  <a:pt x="8755694" y="3930010"/>
+                </a:lnTo>
+                <a:lnTo>
+                  <a:pt x="8493535" y="4266835"/>
+                </a:lnTo>
+                <a:lnTo>
+                  <a:pt x="8493535" y="5031743"/>
+                </a:lnTo>
+                <a:lnTo>
+                  <a:pt x="8868523" y="5197667"/>
+                </a:lnTo>
+                <a:lnTo>
+                  <a:pt x="8868523" y="4217058"/>
+                </a:lnTo>
+                <a:lnTo>
+                  <a:pt x="10570899" y="3874276"/>
+                </a:lnTo>
+                <a:lnTo>
+                  <a:pt x="10570899" y="5318791"/>
+                </a:lnTo>
+                <a:lnTo>
+                  <a:pt x="8873500" y="5186052"/>
+                </a:lnTo>
+                <a:lnTo>
+                  <a:pt x="9455892" y="5947642"/>
+                </a:lnTo>
+                <a:lnTo>
+                  <a:pt x="9455892" y="5575973"/>
+                </a:lnTo>
+                <a:lnTo>
+                  <a:pt x="10484619" y="5950960"/>
+                </a:lnTo>
+                <a:lnTo>
+                  <a:pt x="11148314" y="5406731"/>
+                </a:lnTo>
+                <a:lnTo>
+                  <a:pt x="11148314" y="3790634"/>
+                </a:lnTo>
+                <a:lnTo>
+                  <a:pt x="10570899" y="3863640"/>
+                </a:lnTo>
+                <a:lnTo>
+                  <a:pt x="10570899" y="3864875"/>
+                </a:lnTo>
+                <a:close/>
+                <a:moveTo>
+                  <a:pt x="0" y="0"/>
+                </a:moveTo>
+                <a:lnTo>
+                  <a:pt x="12192000" y="0"/>
+                </a:lnTo>
+                <a:lnTo>
+                  <a:pt x="12192000" y="6857999"/>
+                </a:lnTo>
+                <a:lnTo>
+                  <a:pt x="0" y="6857999"/>
+                </a:lnTo>
+                <a:close/>
+              </a:path>
+            </a:pathLst>
+          </a:custGeom>
+          <a:gradFill flip="none" rotWithShape="1">
+            <a:gsLst>
+              <a:gs pos="0">
+                <a:srgbClr val="0279D5"/>
+              </a:gs>
+              <a:gs pos="100000">
+                <a:srgbClr val="539BEB"/>
+              </a:gs>
+            </a:gsLst>
+            <a:lin ang="2700000" scaled="1"/>
+            <a:tileRect/>
+          </a:gradFill>
+          <a:ln>
+            <a:noFill/>
+          </a:ln>
+        </p:spPr>
+        <p:style>
+          <a:lnRef idx="2">
+            <a:schemeClr val="accent1">
+              <a:shade val="15000"/>
+            </a:schemeClr>
+          </a:lnRef>
+          <a:fillRef idx="1">
+            <a:schemeClr val="accent1"/>
+          </a:fillRef>
+          <a:effectRef idx="0">
+            <a:schemeClr val="accent1"/>
+          </a:effectRef>
+          <a:fontRef idx="minor">
+            <a:schemeClr val="lt1"/>
+          </a:fontRef>
+        </p:style>
+        <p:txBody>
+          <a:bodyPr wrap="square" rtlCol="0" anchor="ctr">
+            <a:noAutofit/>
+          </a:bodyPr>
+          <a:lstStyle/>
+          <a:p>
+            <a:pPr algn="ctr"/>
+            <a:endParaRPr lang="de-DE"/>
+          </a:p>
+        </p:txBody>
+      </p:sp>
+      <p:sp>
+        <p:nvSpPr>
           <p:cNvPr id="2" name="Titel 1">
             <a:extLst>
               <a:ext uri="{FF2B5EF4-FFF2-40B4-BE49-F238E27FC236}">
-                <a16:creationId xmlns:a16="http://schemas.microsoft.com/office/drawing/2014/main" id="{7BD85D28-F471-02AE-A3C5-8A110EE3F72E}"/>
+                <a16:creationId xmlns:a16="http://schemas.microsoft.com/office/drawing/2014/main" id="{A9C06074-1873-CE2A-AD8B-37D974D2A123}"/>
               </a:ext>
             </a:extLst>
           </p:cNvPr>
@@ -146,165 +494,42 @@
             <a:spLocks noGrp="1"/>
           </p:cNvSpPr>
           <p:nvPr>
-            <p:ph type="title"/>
+            <p:ph type="ctrTitle"/>
           </p:nvPr>
         </p:nvSpPr>
-        <p:spPr/>
+        <p:spPr>
+          <a:xfrm>
+            <a:off x="1524000" y="1122363"/>
+            <a:ext cx="9144000" cy="2387600"/>
+          </a:xfrm>
+        </p:spPr>
         <p:txBody>
-          <a:bodyPr/>
-          <a:lstStyle/>
+          <a:bodyPr anchor="b">
+            <a:normAutofit/>
+          </a:bodyPr>
+          <a:lstStyle>
+            <a:lvl1pPr algn="ctr">
+              <a:defRPr sz="7200" b="1">
+                <a:solidFill>
+                  <a:schemeClr val="bg1"/>
+                </a:solidFill>
+                <a:latin typeface="Segoe UI Light" panose="020B0502040204020203" pitchFamily="34" charset="0"/>
+                <a:cs typeface="Segoe UI Light" panose="020B0502040204020203" pitchFamily="34" charset="0"/>
+              </a:defRPr>
+            </a:lvl1pPr>
+          </a:lstStyle>
           <a:p>
             <a:r>
-              <a:rPr lang="de-DE"/>
+              <a:rPr lang="de-DE" dirty="0"/>
               <a:t>Mastertitelformat bearbeiten</a:t>
             </a:r>
-          </a:p>
-        </p:txBody>
-      </p:sp>
-      <p:sp>
-        <p:nvSpPr>
-          <p:cNvPr id="3" name="Inhaltsplatzhalter 2">
-            <a:extLst>
-              <a:ext uri="{FF2B5EF4-FFF2-40B4-BE49-F238E27FC236}">
-                <a16:creationId xmlns:a16="http://schemas.microsoft.com/office/drawing/2014/main" id="{0572E60C-E27B-12F5-92BD-66AC2B55DD21}"/>
-              </a:ext>
-            </a:extLst>
-          </p:cNvPr>
-          <p:cNvSpPr>
-            <a:spLocks noGrp="1"/>
-          </p:cNvSpPr>
-          <p:nvPr>
-            <p:ph idx="1"/>
-          </p:nvPr>
-        </p:nvSpPr>
-        <p:spPr/>
-        <p:txBody>
-          <a:bodyPr/>
-          <a:lstStyle/>
-          <a:p>
-            <a:pPr lvl="0"/>
-            <a:r>
-              <a:rPr lang="de-DE"/>
-              <a:t>Mastertextformat bearbeiten</a:t>
-            </a:r>
-          </a:p>
-          <a:p>
-            <a:pPr lvl="1"/>
-            <a:r>
-              <a:rPr lang="de-DE"/>
-              <a:t>Zweite Ebene</a:t>
-            </a:r>
-          </a:p>
-          <a:p>
-            <a:pPr lvl="2"/>
-            <a:r>
-              <a:rPr lang="de-DE"/>
-              <a:t>Dritte Ebene</a:t>
-            </a:r>
-          </a:p>
-          <a:p>
-            <a:pPr lvl="3"/>
-            <a:r>
-              <a:rPr lang="de-DE"/>
-              <a:t>Vierte Ebene</a:t>
-            </a:r>
-          </a:p>
-          <a:p>
-            <a:pPr lvl="4"/>
-            <a:r>
-              <a:rPr lang="de-DE"/>
-              <a:t>Fünfte Ebene</a:t>
-            </a:r>
-          </a:p>
-        </p:txBody>
-      </p:sp>
-      <p:sp>
-        <p:nvSpPr>
-          <p:cNvPr id="4" name="Datumsplatzhalter 3">
-            <a:extLst>
-              <a:ext uri="{FF2B5EF4-FFF2-40B4-BE49-F238E27FC236}">
-                <a16:creationId xmlns:a16="http://schemas.microsoft.com/office/drawing/2014/main" id="{58452178-BC25-633D-F8F7-B6B4468FB7FD}"/>
-              </a:ext>
-            </a:extLst>
-          </p:cNvPr>
-          <p:cNvSpPr>
-            <a:spLocks noGrp="1"/>
-          </p:cNvSpPr>
-          <p:nvPr>
-            <p:ph type="dt" sz="half" idx="10"/>
-          </p:nvPr>
-        </p:nvSpPr>
-        <p:spPr/>
-        <p:txBody>
-          <a:bodyPr/>
-          <a:lstStyle/>
-          <a:p>
-            <a:fld id="{EAEC61EB-ABD6-4FAE-AC4F-BD0C9A60D6B7}" type="datetimeFigureOut">
-              <a:rPr lang="de-DE" smtClean="0"/>
-              <a:t>16.12.2023</a:t>
-            </a:fld>
-            <a:endParaRPr lang="de-DE"/>
-          </a:p>
-        </p:txBody>
-      </p:sp>
-      <p:sp>
-        <p:nvSpPr>
-          <p:cNvPr id="5" name="Fußzeilenplatzhalter 4">
-            <a:extLst>
-              <a:ext uri="{FF2B5EF4-FFF2-40B4-BE49-F238E27FC236}">
-                <a16:creationId xmlns:a16="http://schemas.microsoft.com/office/drawing/2014/main" id="{B81DB46E-F75E-E9F8-EAA6-D21DE89DF5D1}"/>
-              </a:ext>
-            </a:extLst>
-          </p:cNvPr>
-          <p:cNvSpPr>
-            <a:spLocks noGrp="1"/>
-          </p:cNvSpPr>
-          <p:nvPr>
-            <p:ph type="ftr" sz="quarter" idx="11"/>
-          </p:nvPr>
-        </p:nvSpPr>
-        <p:spPr/>
-        <p:txBody>
-          <a:bodyPr/>
-          <a:lstStyle/>
-          <a:p>
-            <a:endParaRPr lang="de-DE"/>
-          </a:p>
-        </p:txBody>
-      </p:sp>
-      <p:sp>
-        <p:nvSpPr>
-          <p:cNvPr id="6" name="Foliennummernplatzhalter 5">
-            <a:extLst>
-              <a:ext uri="{FF2B5EF4-FFF2-40B4-BE49-F238E27FC236}">
-                <a16:creationId xmlns:a16="http://schemas.microsoft.com/office/drawing/2014/main" id="{824B3A4D-BBD4-E516-12FC-EE6CF7EAACB3}"/>
-              </a:ext>
-            </a:extLst>
-          </p:cNvPr>
-          <p:cNvSpPr>
-            <a:spLocks noGrp="1"/>
-          </p:cNvSpPr>
-          <p:nvPr>
-            <p:ph type="sldNum" sz="quarter" idx="12"/>
-          </p:nvPr>
-        </p:nvSpPr>
-        <p:spPr/>
-        <p:txBody>
-          <a:bodyPr/>
-          <a:lstStyle/>
-          <a:p>
-            <a:fld id="{0E34BF5D-22C2-44F7-9083-EA27BAEA1890}" type="slidenum">
-              <a:rPr lang="de-DE" smtClean="0"/>
-              <a:t>‹Nr.›</a:t>
-            </a:fld>
-            <a:endParaRPr lang="de-DE"/>
           </a:p>
         </p:txBody>
       </p:sp>
     </p:spTree>
     <p:extLst>
       <p:ext uri="{BB962C8B-B14F-4D97-AF65-F5344CB8AC3E}">
-        <p14:creationId xmlns:p14="http://schemas.microsoft.com/office/powerpoint/2010/main" val="1403986267"/>
+        <p14:creationId xmlns:p14="http://schemas.microsoft.com/office/powerpoint/2010/main" val="1235737991"/>
       </p:ext>
     </p:extLst>
   </p:cSld>
@@ -315,8 +540,8 @@
 </file>
 
 <file path=ppt/slideLayouts/slideLayout2.xml><?xml version="1.0" encoding="utf-8"?>
-<p:sldLayout xmlns:a16="http://schemas.microsoft.com/office/drawing/2014/main" xmlns:p14="http://schemas.microsoft.com/office/powerpoint/2010/main" xmlns:a="http://schemas.openxmlformats.org/drawingml/2006/main" xmlns:r="http://schemas.openxmlformats.org/officeDocument/2006/relationships" xmlns:p="http://schemas.openxmlformats.org/presentationml/2006/main" preserve="1" userDrawn="1">
-  <p:cSld name="Test">
+<p:sldLayout xmlns:a="http://schemas.openxmlformats.org/drawingml/2006/main" xmlns:r="http://schemas.openxmlformats.org/officeDocument/2006/relationships" xmlns:p="http://schemas.openxmlformats.org/presentationml/2006/main" preserve="1" userDrawn="1">
+  <p:cSld name="Sub title">
     <p:spTree>
       <p:nvGrpSpPr>
         <p:cNvPr id="1" name=""/>
@@ -333,10 +558,278 @@
       </p:grpSpPr>
       <p:sp>
         <p:nvSpPr>
-          <p:cNvPr id="2" name="Titel 1">
+          <p:cNvPr id="12" name="Freihandform: Form 11">
             <a:extLst>
               <a:ext uri="{FF2B5EF4-FFF2-40B4-BE49-F238E27FC236}">
-                <a16:creationId xmlns:a16="http://schemas.microsoft.com/office/drawing/2014/main" id="{7BD85D28-F471-02AE-A3C5-8A110EE3F72E}"/>
+                <a16:creationId xmlns:a16="http://schemas.microsoft.com/office/drawing/2014/main" id="{2D89E5E3-0188-BB1C-0A32-D9C6077FDDB7}"/>
+              </a:ext>
+            </a:extLst>
+          </p:cNvPr>
+          <p:cNvSpPr/>
+          <p:nvPr userDrawn="1"/>
+        </p:nvSpPr>
+        <p:spPr>
+          <a:xfrm>
+            <a:off x="0" y="0"/>
+            <a:ext cx="12192000" cy="6857999"/>
+          </a:xfrm>
+          <a:custGeom>
+            <a:avLst/>
+            <a:gdLst>
+              <a:gd name="connsiteX0" fmla="*/ 10570899 w 12192000"/>
+              <a:gd name="connsiteY0" fmla="*/ 3864875 h 6857999"/>
+              <a:gd name="connsiteX1" fmla="*/ 10582514 w 12192000"/>
+              <a:gd name="connsiteY1" fmla="*/ 3871937 h 6857999"/>
+              <a:gd name="connsiteX2" fmla="*/ 10570899 w 12192000"/>
+              <a:gd name="connsiteY2" fmla="*/ 3874276 h 6857999"/>
+              <a:gd name="connsiteX3" fmla="*/ 9630112 w 12192000"/>
+              <a:gd name="connsiteY3" fmla="*/ 3292863 h 6857999"/>
+              <a:gd name="connsiteX4" fmla="*/ 9630112 w 12192000"/>
+              <a:gd name="connsiteY4" fmla="*/ 3672828 h 6857999"/>
+              <a:gd name="connsiteX5" fmla="*/ 8755694 w 12192000"/>
+              <a:gd name="connsiteY5" fmla="*/ 3930010 h 6857999"/>
+              <a:gd name="connsiteX6" fmla="*/ 8493535 w 12192000"/>
+              <a:gd name="connsiteY6" fmla="*/ 4266835 h 6857999"/>
+              <a:gd name="connsiteX7" fmla="*/ 8493535 w 12192000"/>
+              <a:gd name="connsiteY7" fmla="*/ 5031743 h 6857999"/>
+              <a:gd name="connsiteX8" fmla="*/ 8868523 w 12192000"/>
+              <a:gd name="connsiteY8" fmla="*/ 5197667 h 6857999"/>
+              <a:gd name="connsiteX9" fmla="*/ 8868523 w 12192000"/>
+              <a:gd name="connsiteY9" fmla="*/ 4217058 h 6857999"/>
+              <a:gd name="connsiteX10" fmla="*/ 10570899 w 12192000"/>
+              <a:gd name="connsiteY10" fmla="*/ 3874276 h 6857999"/>
+              <a:gd name="connsiteX11" fmla="*/ 10570899 w 12192000"/>
+              <a:gd name="connsiteY11" fmla="*/ 5318791 h 6857999"/>
+              <a:gd name="connsiteX12" fmla="*/ 8873500 w 12192000"/>
+              <a:gd name="connsiteY12" fmla="*/ 5186052 h 6857999"/>
+              <a:gd name="connsiteX13" fmla="*/ 9455892 w 12192000"/>
+              <a:gd name="connsiteY13" fmla="*/ 5947642 h 6857999"/>
+              <a:gd name="connsiteX14" fmla="*/ 9455892 w 12192000"/>
+              <a:gd name="connsiteY14" fmla="*/ 5575973 h 6857999"/>
+              <a:gd name="connsiteX15" fmla="*/ 10484619 w 12192000"/>
+              <a:gd name="connsiteY15" fmla="*/ 5950960 h 6857999"/>
+              <a:gd name="connsiteX16" fmla="*/ 11148314 w 12192000"/>
+              <a:gd name="connsiteY16" fmla="*/ 5406731 h 6857999"/>
+              <a:gd name="connsiteX17" fmla="*/ 11148314 w 12192000"/>
+              <a:gd name="connsiteY17" fmla="*/ 3790634 h 6857999"/>
+              <a:gd name="connsiteX18" fmla="*/ 10570899 w 12192000"/>
+              <a:gd name="connsiteY18" fmla="*/ 3863640 h 6857999"/>
+              <a:gd name="connsiteX19" fmla="*/ 10570899 w 12192000"/>
+              <a:gd name="connsiteY19" fmla="*/ 3864875 h 6857999"/>
+              <a:gd name="connsiteX20" fmla="*/ 0 w 12192000"/>
+              <a:gd name="connsiteY20" fmla="*/ 0 h 6857999"/>
+              <a:gd name="connsiteX21" fmla="*/ 12192000 w 12192000"/>
+              <a:gd name="connsiteY21" fmla="*/ 0 h 6857999"/>
+              <a:gd name="connsiteX22" fmla="*/ 12192000 w 12192000"/>
+              <a:gd name="connsiteY22" fmla="*/ 6857999 h 6857999"/>
+              <a:gd name="connsiteX23" fmla="*/ 0 w 12192000"/>
+              <a:gd name="connsiteY23" fmla="*/ 6857999 h 6857999"/>
+            </a:gdLst>
+            <a:ahLst/>
+            <a:cxnLst>
+              <a:cxn ang="0">
+                <a:pos x="connsiteX0" y="connsiteY0"/>
+              </a:cxn>
+              <a:cxn ang="0">
+                <a:pos x="connsiteX1" y="connsiteY1"/>
+              </a:cxn>
+              <a:cxn ang="0">
+                <a:pos x="connsiteX2" y="connsiteY2"/>
+              </a:cxn>
+              <a:cxn ang="0">
+                <a:pos x="connsiteX3" y="connsiteY3"/>
+              </a:cxn>
+              <a:cxn ang="0">
+                <a:pos x="connsiteX4" y="connsiteY4"/>
+              </a:cxn>
+              <a:cxn ang="0">
+                <a:pos x="connsiteX5" y="connsiteY5"/>
+              </a:cxn>
+              <a:cxn ang="0">
+                <a:pos x="connsiteX6" y="connsiteY6"/>
+              </a:cxn>
+              <a:cxn ang="0">
+                <a:pos x="connsiteX7" y="connsiteY7"/>
+              </a:cxn>
+              <a:cxn ang="0">
+                <a:pos x="connsiteX8" y="connsiteY8"/>
+              </a:cxn>
+              <a:cxn ang="0">
+                <a:pos x="connsiteX9" y="connsiteY9"/>
+              </a:cxn>
+              <a:cxn ang="0">
+                <a:pos x="connsiteX10" y="connsiteY10"/>
+              </a:cxn>
+              <a:cxn ang="0">
+                <a:pos x="connsiteX11" y="connsiteY11"/>
+              </a:cxn>
+              <a:cxn ang="0">
+                <a:pos x="connsiteX12" y="connsiteY12"/>
+              </a:cxn>
+              <a:cxn ang="0">
+                <a:pos x="connsiteX13" y="connsiteY13"/>
+              </a:cxn>
+              <a:cxn ang="0">
+                <a:pos x="connsiteX14" y="connsiteY14"/>
+              </a:cxn>
+              <a:cxn ang="0">
+                <a:pos x="connsiteX15" y="connsiteY15"/>
+              </a:cxn>
+              <a:cxn ang="0">
+                <a:pos x="connsiteX16" y="connsiteY16"/>
+              </a:cxn>
+              <a:cxn ang="0">
+                <a:pos x="connsiteX17" y="connsiteY17"/>
+              </a:cxn>
+              <a:cxn ang="0">
+                <a:pos x="connsiteX18" y="connsiteY18"/>
+              </a:cxn>
+              <a:cxn ang="0">
+                <a:pos x="connsiteX19" y="connsiteY19"/>
+              </a:cxn>
+              <a:cxn ang="0">
+                <a:pos x="connsiteX20" y="connsiteY20"/>
+              </a:cxn>
+              <a:cxn ang="0">
+                <a:pos x="connsiteX21" y="connsiteY21"/>
+              </a:cxn>
+              <a:cxn ang="0">
+                <a:pos x="connsiteX22" y="connsiteY22"/>
+              </a:cxn>
+              <a:cxn ang="0">
+                <a:pos x="connsiteX23" y="connsiteY23"/>
+              </a:cxn>
+            </a:cxnLst>
+            <a:rect l="l" t="t" r="r" b="b"/>
+            <a:pathLst>
+              <a:path w="12192000" h="6857999">
+                <a:moveTo>
+                  <a:pt x="10570899" y="3864875"/>
+                </a:moveTo>
+                <a:lnTo>
+                  <a:pt x="10582514" y="3871937"/>
+                </a:lnTo>
+                <a:lnTo>
+                  <a:pt x="10570899" y="3874276"/>
+                </a:lnTo>
+                <a:close/>
+                <a:moveTo>
+                  <a:pt x="9630112" y="3292863"/>
+                </a:moveTo>
+                <a:lnTo>
+                  <a:pt x="9630112" y="3672828"/>
+                </a:lnTo>
+                <a:lnTo>
+                  <a:pt x="8755694" y="3930010"/>
+                </a:lnTo>
+                <a:lnTo>
+                  <a:pt x="8493535" y="4266835"/>
+                </a:lnTo>
+                <a:lnTo>
+                  <a:pt x="8493535" y="5031743"/>
+                </a:lnTo>
+                <a:lnTo>
+                  <a:pt x="8868523" y="5197667"/>
+                </a:lnTo>
+                <a:lnTo>
+                  <a:pt x="8868523" y="4217058"/>
+                </a:lnTo>
+                <a:lnTo>
+                  <a:pt x="10570899" y="3874276"/>
+                </a:lnTo>
+                <a:lnTo>
+                  <a:pt x="10570899" y="5318791"/>
+                </a:lnTo>
+                <a:lnTo>
+                  <a:pt x="8873500" y="5186052"/>
+                </a:lnTo>
+                <a:lnTo>
+                  <a:pt x="9455892" y="5947642"/>
+                </a:lnTo>
+                <a:lnTo>
+                  <a:pt x="9455892" y="5575973"/>
+                </a:lnTo>
+                <a:lnTo>
+                  <a:pt x="10484619" y="5950960"/>
+                </a:lnTo>
+                <a:lnTo>
+                  <a:pt x="11148314" y="5406731"/>
+                </a:lnTo>
+                <a:lnTo>
+                  <a:pt x="11148314" y="3790634"/>
+                </a:lnTo>
+                <a:lnTo>
+                  <a:pt x="10570899" y="3863640"/>
+                </a:lnTo>
+                <a:lnTo>
+                  <a:pt x="10570899" y="3864875"/>
+                </a:lnTo>
+                <a:close/>
+                <a:moveTo>
+                  <a:pt x="0" y="0"/>
+                </a:moveTo>
+                <a:lnTo>
+                  <a:pt x="12192000" y="0"/>
+                </a:lnTo>
+                <a:lnTo>
+                  <a:pt x="12192000" y="6857999"/>
+                </a:lnTo>
+                <a:lnTo>
+                  <a:pt x="0" y="6857999"/>
+                </a:lnTo>
+                <a:close/>
+              </a:path>
+            </a:pathLst>
+          </a:custGeom>
+          <a:gradFill flip="none" rotWithShape="1">
+            <a:gsLst>
+              <a:gs pos="0">
+                <a:srgbClr val="0279D5"/>
+              </a:gs>
+              <a:gs pos="100000">
+                <a:srgbClr val="539BEB"/>
+              </a:gs>
+            </a:gsLst>
+            <a:lin ang="2700000" scaled="1"/>
+            <a:tileRect/>
+          </a:gradFill>
+          <a:ln>
+            <a:noFill/>
+          </a:ln>
+        </p:spPr>
+        <p:style>
+          <a:lnRef idx="2">
+            <a:schemeClr val="accent1">
+              <a:shade val="15000"/>
+            </a:schemeClr>
+          </a:lnRef>
+          <a:fillRef idx="1">
+            <a:schemeClr val="accent1"/>
+          </a:fillRef>
+          <a:effectRef idx="0">
+            <a:schemeClr val="accent1"/>
+          </a:effectRef>
+          <a:fontRef idx="minor">
+            <a:schemeClr val="lt1"/>
+          </a:fontRef>
+        </p:style>
+        <p:txBody>
+          <a:bodyPr wrap="square" rtlCol="0" anchor="ctr">
+            <a:noAutofit/>
+          </a:bodyPr>
+          <a:lstStyle/>
+          <a:p>
+            <a:pPr algn="ctr"/>
+            <a:endParaRPr lang="de-DE"/>
+          </a:p>
+        </p:txBody>
+      </p:sp>
+      <p:sp>
+        <p:nvSpPr>
+          <p:cNvPr id="3" name="Title">
+            <a:extLst>
+              <a:ext uri="{FF2B5EF4-FFF2-40B4-BE49-F238E27FC236}">
+                <a16:creationId xmlns:a16="http://schemas.microsoft.com/office/drawing/2014/main" id="{E696A73E-CC75-3FBC-B874-9CF7C4EF48F6}"/>
               </a:ext>
             </a:extLst>
           </p:cNvPr>
@@ -347,24 +840,132 @@
             <p:ph type="title"/>
           </p:nvPr>
         </p:nvSpPr>
-        <p:spPr/>
+        <p:spPr>
+          <a:xfrm>
+            <a:off x="373711" y="248891"/>
+            <a:ext cx="11444578" cy="859238"/>
+          </a:xfrm>
+        </p:spPr>
         <p:txBody>
-          <a:bodyPr/>
-          <a:lstStyle/>
+          <a:bodyPr anchor="t">
+            <a:noAutofit/>
+          </a:bodyPr>
+          <a:lstStyle>
+            <a:lvl1pPr>
+              <a:defRPr sz="4400" b="1">
+                <a:solidFill>
+                  <a:schemeClr val="bg1"/>
+                </a:solidFill>
+                <a:latin typeface="Segoe UI Light" panose="020B0502040204020203" pitchFamily="34" charset="0"/>
+                <a:cs typeface="Segoe UI Light" panose="020B0502040204020203" pitchFamily="34" charset="0"/>
+              </a:defRPr>
+            </a:lvl1pPr>
+          </a:lstStyle>
           <a:p>
             <a:r>
-              <a:rPr lang="de-DE"/>
+              <a:rPr lang="de-DE" dirty="0"/>
               <a:t>Mastertitelformat bearbeiten</a:t>
             </a:r>
+          </a:p>
+        </p:txBody>
+      </p:sp>
+    </p:spTree>
+    <p:extLst>
+      <p:ext uri="{BB962C8B-B14F-4D97-AF65-F5344CB8AC3E}">
+        <p14:creationId xmlns:p14="http://schemas.microsoft.com/office/powerpoint/2010/main" val="1638036995"/>
+      </p:ext>
+    </p:extLst>
+  </p:cSld>
+  <p:clrMapOvr>
+    <a:masterClrMapping/>
+  </p:clrMapOvr>
+</p:sldLayout>
+</file>
+
+<file path=ppt/slideLayouts/slideLayout3.xml><?xml version="1.0" encoding="utf-8"?>
+<p:sldLayout xmlns:a="http://schemas.openxmlformats.org/drawingml/2006/main" xmlns:r="http://schemas.openxmlformats.org/officeDocument/2006/relationships" xmlns:p="http://schemas.openxmlformats.org/presentationml/2006/main" preserve="1" userDrawn="1">
+  <p:cSld name="Overview">
+    <p:spTree>
+      <p:nvGrpSpPr>
+        <p:cNvPr id="1" name=""/>
+        <p:cNvGrpSpPr/>
+        <p:nvPr/>
+      </p:nvGrpSpPr>
+      <p:grpSpPr>
+        <a:xfrm>
+          <a:off x="0" y="0"/>
+          <a:ext cx="0" cy="0"/>
+          <a:chOff x="0" y="0"/>
+          <a:chExt cx="0" cy="0"/>
+        </a:xfrm>
+      </p:grpSpPr>
+      <p:sp>
+        <p:nvSpPr>
+          <p:cNvPr id="7" name="Title background">
+            <a:extLst>
+              <a:ext uri="{FF2B5EF4-FFF2-40B4-BE49-F238E27FC236}">
+                <a16:creationId xmlns:a16="http://schemas.microsoft.com/office/drawing/2014/main" id="{29745A6F-C397-0126-5AA7-877EE68BD9C3}"/>
+              </a:ext>
+            </a:extLst>
+          </p:cNvPr>
+          <p:cNvSpPr/>
+          <p:nvPr userDrawn="1"/>
+        </p:nvSpPr>
+        <p:spPr>
+          <a:xfrm>
+            <a:off x="0" y="0"/>
+            <a:ext cx="12192000" cy="1358721"/>
+          </a:xfrm>
+          <a:prstGeom prst="rect">
+            <a:avLst/>
+          </a:prstGeom>
+          <a:gradFill flip="none" rotWithShape="1">
+            <a:gsLst>
+              <a:gs pos="0">
+                <a:srgbClr val="0279D4"/>
+              </a:gs>
+              <a:gs pos="100000">
+                <a:srgbClr val="549BEC"/>
+              </a:gs>
+            </a:gsLst>
+            <a:lin ang="2700000" scaled="1"/>
+            <a:tileRect/>
+          </a:gradFill>
+          <a:ln>
+            <a:noFill/>
+          </a:ln>
+        </p:spPr>
+        <p:style>
+          <a:lnRef idx="2">
+            <a:schemeClr val="accent1">
+              <a:shade val="15000"/>
+            </a:schemeClr>
+          </a:lnRef>
+          <a:fillRef idx="1">
+            <a:schemeClr val="accent1"/>
+          </a:fillRef>
+          <a:effectRef idx="0">
+            <a:schemeClr val="accent1"/>
+          </a:effectRef>
+          <a:fontRef idx="minor">
+            <a:schemeClr val="lt1"/>
+          </a:fontRef>
+        </p:style>
+        <p:txBody>
+          <a:bodyPr rtlCol="0" anchor="ctr"/>
+          <a:lstStyle/>
+          <a:p>
+            <a:pPr algn="ctr"/>
+            <a:endParaRPr lang="de-DE"/>
           </a:p>
         </p:txBody>
       </p:sp>
       <p:sp>
         <p:nvSpPr>
-          <p:cNvPr id="4" name="Datumsplatzhalter 3">
+          <p:cNvPr id="2" name="Title">
             <a:extLst>
               <a:ext uri="{FF2B5EF4-FFF2-40B4-BE49-F238E27FC236}">
-                <a16:creationId xmlns:a16="http://schemas.microsoft.com/office/drawing/2014/main" id="{58452178-BC25-633D-F8F7-B6B4468FB7FD}"/>
+                <a16:creationId xmlns:a16="http://schemas.microsoft.com/office/drawing/2014/main" id="{EC7047CA-4469-CD2B-F706-7159E6E3AC5D}"/>
               </a:ext>
             </a:extLst>
           </p:cNvPr>
@@ -372,82 +973,105 @@
             <a:spLocks noGrp="1"/>
           </p:cNvSpPr>
           <p:nvPr>
-            <p:ph type="dt" sz="half" idx="10"/>
+            <p:ph type="title"/>
           </p:nvPr>
         </p:nvSpPr>
-        <p:spPr/>
+        <p:spPr>
+          <a:xfrm>
+            <a:off x="373711" y="248891"/>
+            <a:ext cx="11444578" cy="859238"/>
+          </a:xfrm>
+        </p:spPr>
         <p:txBody>
-          <a:bodyPr/>
-          <a:lstStyle/>
-          <a:p>
-            <a:fld id="{EAEC61EB-ABD6-4FAE-AC4F-BD0C9A60D6B7}" type="datetimeFigureOut">
-              <a:rPr lang="de-DE" smtClean="0"/>
-              <a:t>16.12.2023</a:t>
-            </a:fld>
-            <a:endParaRPr lang="de-DE"/>
+          <a:bodyPr anchor="t">
+            <a:noAutofit/>
+          </a:bodyPr>
+          <a:lstStyle>
+            <a:lvl1pPr>
+              <a:defRPr sz="2800" b="1">
+                <a:solidFill>
+                  <a:schemeClr val="bg1"/>
+                </a:solidFill>
+                <a:latin typeface="Segoe UI Light" panose="020B0502040204020203" pitchFamily="34" charset="0"/>
+                <a:cs typeface="Segoe UI Light" panose="020B0502040204020203" pitchFamily="34" charset="0"/>
+              </a:defRPr>
+            </a:lvl1pPr>
+          </a:lstStyle>
+          <a:p>
+            <a:r>
+              <a:rPr lang="de-DE" dirty="0"/>
+              <a:t>Mastertitelformat bearbeiten</a:t>
+            </a:r>
           </a:p>
         </p:txBody>
       </p:sp>
       <p:sp>
         <p:nvSpPr>
-          <p:cNvPr id="5" name="Fußzeilenplatzhalter 4">
+          <p:cNvPr id="5" name="Changes background">
             <a:extLst>
               <a:ext uri="{FF2B5EF4-FFF2-40B4-BE49-F238E27FC236}">
-                <a16:creationId xmlns:a16="http://schemas.microsoft.com/office/drawing/2014/main" id="{B81DB46E-F75E-E9F8-EAA6-D21DE89DF5D1}"/>
+                <a16:creationId xmlns:a16="http://schemas.microsoft.com/office/drawing/2014/main" id="{256EE8F2-DE04-5DAC-1E60-581E8C72208C}"/>
               </a:ext>
             </a:extLst>
           </p:cNvPr>
-          <p:cNvSpPr>
-            <a:spLocks noGrp="1"/>
-          </p:cNvSpPr>
-          <p:nvPr>
-            <p:ph type="ftr" sz="quarter" idx="11"/>
-          </p:nvPr>
+          <p:cNvSpPr/>
+          <p:nvPr userDrawn="1"/>
         </p:nvSpPr>
-        <p:spPr/>
+        <p:spPr>
+          <a:xfrm>
+            <a:off x="993913" y="1993126"/>
+            <a:ext cx="1371600" cy="1371600"/>
+          </a:xfrm>
+          <a:prstGeom prst="rect">
+            <a:avLst/>
+          </a:prstGeom>
+          <a:gradFill flip="none" rotWithShape="1">
+            <a:gsLst>
+              <a:gs pos="0">
+                <a:srgbClr val="0279D4"/>
+              </a:gs>
+              <a:gs pos="100000">
+                <a:srgbClr val="549BEC"/>
+              </a:gs>
+            </a:gsLst>
+            <a:lin ang="2700000" scaled="1"/>
+            <a:tileRect/>
+          </a:gradFill>
+          <a:ln>
+            <a:noFill/>
+          </a:ln>
+        </p:spPr>
+        <p:style>
+          <a:lnRef idx="2">
+            <a:schemeClr val="accent1">
+              <a:shade val="15000"/>
+            </a:schemeClr>
+          </a:lnRef>
+          <a:fillRef idx="1">
+            <a:schemeClr val="accent1"/>
+          </a:fillRef>
+          <a:effectRef idx="0">
+            <a:schemeClr val="accent1"/>
+          </a:effectRef>
+          <a:fontRef idx="minor">
+            <a:schemeClr val="lt1"/>
+          </a:fontRef>
+        </p:style>
         <p:txBody>
-          <a:bodyPr/>
+          <a:bodyPr rtlCol="0" anchor="ctr"/>
           <a:lstStyle/>
           <a:p>
+            <a:pPr algn="ctr"/>
             <a:endParaRPr lang="de-DE"/>
           </a:p>
         </p:txBody>
       </p:sp>
       <p:sp>
         <p:nvSpPr>
-          <p:cNvPr id="6" name="Foliennummernplatzhalter 5">
+          <p:cNvPr id="6" name="Header1">
             <a:extLst>
               <a:ext uri="{FF2B5EF4-FFF2-40B4-BE49-F238E27FC236}">
-                <a16:creationId xmlns:a16="http://schemas.microsoft.com/office/drawing/2014/main" id="{824B3A4D-BBD4-E516-12FC-EE6CF7EAACB3}"/>
-              </a:ext>
-            </a:extLst>
-          </p:cNvPr>
-          <p:cNvSpPr>
-            <a:spLocks noGrp="1"/>
-          </p:cNvSpPr>
-          <p:nvPr>
-            <p:ph type="sldNum" sz="quarter" idx="12"/>
-          </p:nvPr>
-        </p:nvSpPr>
-        <p:spPr/>
-        <p:txBody>
-          <a:bodyPr/>
-          <a:lstStyle/>
-          <a:p>
-            <a:fld id="{0E34BF5D-22C2-44F7-9083-EA27BAEA1890}" type="slidenum">
-              <a:rPr lang="de-DE" smtClean="0"/>
-              <a:t>‹Nr.›</a:t>
-            </a:fld>
-            <a:endParaRPr lang="de-DE"/>
-          </a:p>
-        </p:txBody>
-      </p:sp>
-      <p:sp>
-        <p:nvSpPr>
-          <p:cNvPr id="7" name="Textfeld 6">
-            <a:extLst>
-              <a:ext uri="{FF2B5EF4-FFF2-40B4-BE49-F238E27FC236}">
-                <a16:creationId xmlns:a16="http://schemas.microsoft.com/office/drawing/2014/main" id="{4E0A77F5-741D-1FAA-1509-AE1E31FD6686}"/>
+                <a16:creationId xmlns:a16="http://schemas.microsoft.com/office/drawing/2014/main" id="{1D3C6702-E79A-67C6-F826-2BCC0F98A173}"/>
               </a:ext>
             </a:extLst>
           </p:cNvPr>
@@ -456,8 +1080,8 @@
         </p:nvSpPr>
         <p:spPr>
           <a:xfrm>
-            <a:off x="585989" y="2455709"/>
-            <a:ext cx="2157211" cy="369332"/>
+            <a:off x="993913" y="1993126"/>
+            <a:ext cx="1371600" cy="369332"/>
           </a:xfrm>
           <a:prstGeom prst="rect">
             <a:avLst/>
@@ -470,20 +1094,29 @@
           </a:bodyPr>
           <a:lstStyle/>
           <a:p>
+            <a:pPr algn="ctr"/>
             <a:r>
-              <a:rPr lang="en-US" dirty="0"/>
-              <a:t>Hallo</a:t>
+              <a:rPr lang="en-US" dirty="0">
+                <a:solidFill>
+                  <a:schemeClr val="bg1"/>
+                </a:solidFill>
+              </a:rPr>
+              <a:t>Changes</a:t>
             </a:r>
-            <a:endParaRPr lang="de-DE" dirty="0"/>
+            <a:endParaRPr lang="de-DE" dirty="0">
+              <a:solidFill>
+                <a:schemeClr val="bg1"/>
+              </a:solidFill>
+            </a:endParaRPr>
           </a:p>
         </p:txBody>
       </p:sp>
       <p:sp>
         <p:nvSpPr>
-          <p:cNvPr id="10" name="textfield1">
+          <p:cNvPr id="3" name="Content1">
             <a:extLst>
               <a:ext uri="{FF2B5EF4-FFF2-40B4-BE49-F238E27FC236}">
-                <a16:creationId xmlns:a16="http://schemas.microsoft.com/office/drawing/2014/main" id="{8930884B-3D71-E885-83D4-239A76C51C68}"/>
+                <a16:creationId xmlns:a16="http://schemas.microsoft.com/office/drawing/2014/main" id="{75533CEB-DBFF-06E5-8302-EBE4F9E15F08}"/>
               </a:ext>
             </a:extLst>
           </p:cNvPr>
@@ -491,61 +1124,180 @@
             <a:spLocks noGrp="1"/>
           </p:cNvSpPr>
           <p:nvPr>
-            <p:ph sz="quarter" idx="13"/>
+            <p:ph idx="1"/>
           </p:nvPr>
         </p:nvSpPr>
         <p:spPr>
           <a:xfrm>
-            <a:off x="3194050" y="2692400"/>
-            <a:ext cx="2608263" cy="1905000"/>
+            <a:off x="993913" y="2362458"/>
+            <a:ext cx="1371600" cy="1002268"/>
           </a:xfrm>
         </p:spPr>
         <p:txBody>
-          <a:bodyPr/>
-          <a:lstStyle/>
+          <a:bodyPr anchor="ctr">
+            <a:noAutofit/>
+          </a:bodyPr>
+          <a:lstStyle>
+            <a:lvl1pPr marL="0" indent="0" algn="ctr">
+              <a:spcBef>
+                <a:spcPts val="400"/>
+              </a:spcBef>
+              <a:buNone/>
+              <a:defRPr sz="2800" b="1">
+                <a:solidFill>
+                  <a:schemeClr val="bg1"/>
+                </a:solidFill>
+                <a:latin typeface="Segoe UI Light" panose="020B0502040204020203" pitchFamily="34" charset="0"/>
+                <a:cs typeface="Segoe UI Light" panose="020B0502040204020203" pitchFamily="34" charset="0"/>
+              </a:defRPr>
+            </a:lvl1pPr>
+            <a:lvl2pPr marL="457200" indent="0" algn="ctr">
+              <a:buNone/>
+              <a:defRPr sz="2800" b="1">
+                <a:latin typeface="Segoe UI Light" panose="020B0502040204020203" pitchFamily="34" charset="0"/>
+                <a:cs typeface="Segoe UI Light" panose="020B0502040204020203" pitchFamily="34" charset="0"/>
+              </a:defRPr>
+            </a:lvl2pPr>
+            <a:lvl3pPr marL="914400" indent="0" algn="ctr">
+              <a:buNone/>
+              <a:defRPr sz="2800" b="1">
+                <a:latin typeface="Segoe UI Light" panose="020B0502040204020203" pitchFamily="34" charset="0"/>
+                <a:cs typeface="Segoe UI Light" panose="020B0502040204020203" pitchFamily="34" charset="0"/>
+              </a:defRPr>
+            </a:lvl3pPr>
+            <a:lvl4pPr marL="1371600" indent="0" algn="ctr">
+              <a:buNone/>
+              <a:defRPr sz="2800" b="1">
+                <a:latin typeface="Segoe UI Light" panose="020B0502040204020203" pitchFamily="34" charset="0"/>
+                <a:cs typeface="Segoe UI Light" panose="020B0502040204020203" pitchFamily="34" charset="0"/>
+              </a:defRPr>
+            </a:lvl4pPr>
+            <a:lvl5pPr marL="1828800" indent="0" algn="ctr">
+              <a:buNone/>
+              <a:defRPr sz="2800" b="1">
+                <a:latin typeface="Segoe UI Light" panose="020B0502040204020203" pitchFamily="34" charset="0"/>
+                <a:cs typeface="Segoe UI Light" panose="020B0502040204020203" pitchFamily="34" charset="0"/>
+              </a:defRPr>
+            </a:lvl5pPr>
+          </a:lstStyle>
           <a:p>
             <a:pPr lvl="0"/>
-            <a:r>
-              <a:rPr lang="de-DE"/>
-              <a:t>Mastertextformat bearbeiten</a:t>
-            </a:r>
-          </a:p>
-          <a:p>
-            <a:pPr lvl="1"/>
-            <a:r>
-              <a:rPr lang="de-DE"/>
-              <a:t>Zweite Ebene</a:t>
-            </a:r>
-          </a:p>
-          <a:p>
-            <a:pPr lvl="2"/>
-            <a:r>
-              <a:rPr lang="de-DE"/>
-              <a:t>Dritte Ebene</a:t>
-            </a:r>
-          </a:p>
-          <a:p>
-            <a:pPr lvl="3"/>
-            <a:r>
-              <a:rPr lang="de-DE"/>
-              <a:t>Vierte Ebene</a:t>
-            </a:r>
-          </a:p>
-          <a:p>
-            <a:pPr lvl="4"/>
-            <a:r>
-              <a:rPr lang="de-DE"/>
-              <a:t>Fünfte Ebene</a:t>
-            </a:r>
+            <a:endParaRPr lang="de-DE" dirty="0"/>
           </a:p>
         </p:txBody>
       </p:sp>
       <p:sp>
         <p:nvSpPr>
-          <p:cNvPr id="12" name="textfield2">
+          <p:cNvPr id="4" name="Changes background">
             <a:extLst>
               <a:ext uri="{FF2B5EF4-FFF2-40B4-BE49-F238E27FC236}">
-                <a16:creationId xmlns:a16="http://schemas.microsoft.com/office/drawing/2014/main" id="{549C0ACC-711B-0FAB-059C-C2A4D9333524}"/>
+                <a16:creationId xmlns:a16="http://schemas.microsoft.com/office/drawing/2014/main" id="{EA28A555-4BD1-09D1-9794-5337C5B74973}"/>
+              </a:ext>
+            </a:extLst>
+          </p:cNvPr>
+          <p:cNvSpPr/>
+          <p:nvPr userDrawn="1"/>
+        </p:nvSpPr>
+        <p:spPr>
+          <a:xfrm>
+            <a:off x="2562989" y="1993126"/>
+            <a:ext cx="1371600" cy="1371600"/>
+          </a:xfrm>
+          <a:prstGeom prst="rect">
+            <a:avLst/>
+          </a:prstGeom>
+          <a:gradFill flip="none" rotWithShape="1">
+            <a:gsLst>
+              <a:gs pos="0">
+                <a:srgbClr val="0279D4"/>
+              </a:gs>
+              <a:gs pos="100000">
+                <a:srgbClr val="549BEC"/>
+              </a:gs>
+            </a:gsLst>
+            <a:lin ang="2700000" scaled="1"/>
+            <a:tileRect/>
+          </a:gradFill>
+          <a:ln>
+            <a:noFill/>
+          </a:ln>
+        </p:spPr>
+        <p:style>
+          <a:lnRef idx="2">
+            <a:schemeClr val="accent1">
+              <a:shade val="15000"/>
+            </a:schemeClr>
+          </a:lnRef>
+          <a:fillRef idx="1">
+            <a:schemeClr val="accent1"/>
+          </a:fillRef>
+          <a:effectRef idx="0">
+            <a:schemeClr val="accent1"/>
+          </a:effectRef>
+          <a:fontRef idx="minor">
+            <a:schemeClr val="lt1"/>
+          </a:fontRef>
+        </p:style>
+        <p:txBody>
+          <a:bodyPr rtlCol="0" anchor="ctr"/>
+          <a:lstStyle/>
+          <a:p>
+            <a:pPr algn="ctr"/>
+            <a:endParaRPr lang="de-DE"/>
+          </a:p>
+        </p:txBody>
+      </p:sp>
+      <p:sp>
+        <p:nvSpPr>
+          <p:cNvPr id="8" name="Header2">
+            <a:extLst>
+              <a:ext uri="{FF2B5EF4-FFF2-40B4-BE49-F238E27FC236}">
+                <a16:creationId xmlns:a16="http://schemas.microsoft.com/office/drawing/2014/main" id="{C0A962BF-A7D6-A297-3540-02133A8A35CC}"/>
+              </a:ext>
+            </a:extLst>
+          </p:cNvPr>
+          <p:cNvSpPr txBox="1"/>
+          <p:nvPr userDrawn="1"/>
+        </p:nvSpPr>
+        <p:spPr>
+          <a:xfrm>
+            <a:off x="2562989" y="1993126"/>
+            <a:ext cx="1371600" cy="369332"/>
+          </a:xfrm>
+          <a:prstGeom prst="rect">
+            <a:avLst/>
+          </a:prstGeom>
+          <a:noFill/>
+        </p:spPr>
+        <p:txBody>
+          <a:bodyPr wrap="square" rtlCol="0">
+            <a:spAutoFit/>
+          </a:bodyPr>
+          <a:lstStyle/>
+          <a:p>
+            <a:pPr algn="ctr"/>
+            <a:r>
+              <a:rPr lang="en-US" dirty="0">
+                <a:solidFill>
+                  <a:schemeClr val="bg1"/>
+                </a:solidFill>
+              </a:rPr>
+              <a:t>Changes</a:t>
+            </a:r>
+            <a:endParaRPr lang="de-DE" dirty="0">
+              <a:solidFill>
+                <a:schemeClr val="bg1"/>
+              </a:solidFill>
+            </a:endParaRPr>
+          </a:p>
+        </p:txBody>
+      </p:sp>
+      <p:sp>
+        <p:nvSpPr>
+          <p:cNvPr id="9" name="Content2">
+            <a:extLst>
+              <a:ext uri="{FF2B5EF4-FFF2-40B4-BE49-F238E27FC236}">
+                <a16:creationId xmlns:a16="http://schemas.microsoft.com/office/drawing/2014/main" id="{A2B0BED6-651E-6877-AB8C-6D8C8271825A}"/>
               </a:ext>
             </a:extLst>
           </p:cNvPr>
@@ -553,59 +1305,311 @@
             <a:spLocks noGrp="1"/>
           </p:cNvSpPr>
           <p:nvPr>
-            <p:ph sz="quarter" idx="14"/>
+            <p:ph idx="10"/>
           </p:nvPr>
         </p:nvSpPr>
         <p:spPr>
           <a:xfrm>
-            <a:off x="7134225" y="2633663"/>
-            <a:ext cx="2911475" cy="1738312"/>
+            <a:off x="2562989" y="2362458"/>
+            <a:ext cx="1371600" cy="1002268"/>
           </a:xfrm>
         </p:spPr>
         <p:txBody>
-          <a:bodyPr/>
-          <a:lstStyle/>
+          <a:bodyPr anchor="ctr">
+            <a:noAutofit/>
+          </a:bodyPr>
+          <a:lstStyle>
+            <a:lvl1pPr marL="0" indent="0" algn="ctr">
+              <a:spcBef>
+                <a:spcPts val="400"/>
+              </a:spcBef>
+              <a:buNone/>
+              <a:defRPr sz="2800" b="1">
+                <a:solidFill>
+                  <a:schemeClr val="bg1"/>
+                </a:solidFill>
+                <a:latin typeface="Segoe UI Light" panose="020B0502040204020203" pitchFamily="34" charset="0"/>
+                <a:cs typeface="Segoe UI Light" panose="020B0502040204020203" pitchFamily="34" charset="0"/>
+              </a:defRPr>
+            </a:lvl1pPr>
+            <a:lvl2pPr marL="457200" indent="0" algn="ctr">
+              <a:buNone/>
+              <a:defRPr sz="2800" b="1">
+                <a:latin typeface="Segoe UI Light" panose="020B0502040204020203" pitchFamily="34" charset="0"/>
+                <a:cs typeface="Segoe UI Light" panose="020B0502040204020203" pitchFamily="34" charset="0"/>
+              </a:defRPr>
+            </a:lvl2pPr>
+            <a:lvl3pPr marL="914400" indent="0" algn="ctr">
+              <a:buNone/>
+              <a:defRPr sz="2800" b="1">
+                <a:latin typeface="Segoe UI Light" panose="020B0502040204020203" pitchFamily="34" charset="0"/>
+                <a:cs typeface="Segoe UI Light" panose="020B0502040204020203" pitchFamily="34" charset="0"/>
+              </a:defRPr>
+            </a:lvl3pPr>
+            <a:lvl4pPr marL="1371600" indent="0" algn="ctr">
+              <a:buNone/>
+              <a:defRPr sz="2800" b="1">
+                <a:latin typeface="Segoe UI Light" panose="020B0502040204020203" pitchFamily="34" charset="0"/>
+                <a:cs typeface="Segoe UI Light" panose="020B0502040204020203" pitchFamily="34" charset="0"/>
+              </a:defRPr>
+            </a:lvl4pPr>
+            <a:lvl5pPr marL="1828800" indent="0" algn="ctr">
+              <a:buNone/>
+              <a:defRPr sz="2800" b="1">
+                <a:latin typeface="Segoe UI Light" panose="020B0502040204020203" pitchFamily="34" charset="0"/>
+                <a:cs typeface="Segoe UI Light" panose="020B0502040204020203" pitchFamily="34" charset="0"/>
+              </a:defRPr>
+            </a:lvl5pPr>
+          </a:lstStyle>
           <a:p>
             <a:pPr lvl="0"/>
-            <a:r>
-              <a:rPr lang="de-DE"/>
-              <a:t>Mastertextformat bearbeiten</a:t>
-            </a:r>
-          </a:p>
-          <a:p>
-            <a:pPr lvl="1"/>
-            <a:r>
-              <a:rPr lang="de-DE"/>
-              <a:t>Zweite Ebene</a:t>
-            </a:r>
-          </a:p>
-          <a:p>
-            <a:pPr lvl="2"/>
-            <a:r>
-              <a:rPr lang="de-DE"/>
-              <a:t>Dritte Ebene</a:t>
-            </a:r>
-          </a:p>
-          <a:p>
-            <a:pPr lvl="3"/>
-            <a:r>
-              <a:rPr lang="de-DE"/>
-              <a:t>Vierte Ebene</a:t>
-            </a:r>
-          </a:p>
-          <a:p>
-            <a:pPr lvl="4"/>
-            <a:r>
-              <a:rPr lang="de-DE"/>
-              <a:t>Fünfte Ebene</a:t>
-            </a:r>
+            <a:endParaRPr lang="de-DE" dirty="0"/>
           </a:p>
         </p:txBody>
       </p:sp>
     </p:spTree>
     <p:extLst>
       <p:ext uri="{BB962C8B-B14F-4D97-AF65-F5344CB8AC3E}">
-        <p14:creationId xmlns:p14="http://schemas.microsoft.com/office/powerpoint/2010/main" val="3607726069"/>
+        <p14:creationId xmlns:p14="http://schemas.microsoft.com/office/powerpoint/2010/main" val="695464166"/>
+      </p:ext>
+    </p:extLst>
+  </p:cSld>
+  <p:clrMapOvr>
+    <a:masterClrMapping/>
+  </p:clrMapOvr>
+</p:sldLayout>
+</file>
+
+<file path=ppt/slideLayouts/slideLayout4.xml><?xml version="1.0" encoding="utf-8"?>
+<p:sldLayout xmlns:a="http://schemas.openxmlformats.org/drawingml/2006/main" xmlns:r="http://schemas.openxmlformats.org/officeDocument/2006/relationships" xmlns:p="http://schemas.openxmlformats.org/presentationml/2006/main" type="obj" preserve="1">
+  <p:cSld name="SingleChange">
+    <p:spTree>
+      <p:nvGrpSpPr>
+        <p:cNvPr id="1" name=""/>
+        <p:cNvGrpSpPr/>
+        <p:nvPr/>
+      </p:nvGrpSpPr>
+      <p:grpSpPr>
+        <a:xfrm>
+          <a:off x="0" y="0"/>
+          <a:ext cx="0" cy="0"/>
+          <a:chOff x="0" y="0"/>
+          <a:chExt cx="0" cy="0"/>
+        </a:xfrm>
+      </p:grpSpPr>
+      <p:sp>
+        <p:nvSpPr>
+          <p:cNvPr id="7" name="Title bar">
+            <a:extLst>
+              <a:ext uri="{FF2B5EF4-FFF2-40B4-BE49-F238E27FC236}">
+                <a16:creationId xmlns:a16="http://schemas.microsoft.com/office/drawing/2014/main" id="{29745A6F-C397-0126-5AA7-877EE68BD9C3}"/>
+              </a:ext>
+            </a:extLst>
+          </p:cNvPr>
+          <p:cNvSpPr/>
+          <p:nvPr userDrawn="1"/>
+        </p:nvSpPr>
+        <p:spPr>
+          <a:xfrm>
+            <a:off x="0" y="0"/>
+            <a:ext cx="12192000" cy="1358721"/>
+          </a:xfrm>
+          <a:prstGeom prst="rect">
+            <a:avLst/>
+          </a:prstGeom>
+          <a:gradFill flip="none" rotWithShape="1">
+            <a:gsLst>
+              <a:gs pos="0">
+                <a:srgbClr val="0279D4"/>
+              </a:gs>
+              <a:gs pos="100000">
+                <a:srgbClr val="549BEC"/>
+              </a:gs>
+            </a:gsLst>
+            <a:lin ang="2700000" scaled="1"/>
+            <a:tileRect/>
+          </a:gradFill>
+          <a:ln>
+            <a:noFill/>
+          </a:ln>
+        </p:spPr>
+        <p:style>
+          <a:lnRef idx="2">
+            <a:schemeClr val="accent1">
+              <a:shade val="15000"/>
+            </a:schemeClr>
+          </a:lnRef>
+          <a:fillRef idx="1">
+            <a:schemeClr val="accent1"/>
+          </a:fillRef>
+          <a:effectRef idx="0">
+            <a:schemeClr val="accent1"/>
+          </a:effectRef>
+          <a:fontRef idx="minor">
+            <a:schemeClr val="lt1"/>
+          </a:fontRef>
+        </p:style>
+        <p:txBody>
+          <a:bodyPr rtlCol="0" anchor="ctr"/>
+          <a:lstStyle/>
+          <a:p>
+            <a:pPr algn="ctr"/>
+            <a:endParaRPr lang="de-DE"/>
+          </a:p>
+        </p:txBody>
+      </p:sp>
+      <p:sp>
+        <p:nvSpPr>
+          <p:cNvPr id="2" name="Title">
+            <a:extLst>
+              <a:ext uri="{FF2B5EF4-FFF2-40B4-BE49-F238E27FC236}">
+                <a16:creationId xmlns:a16="http://schemas.microsoft.com/office/drawing/2014/main" id="{EC7047CA-4469-CD2B-F706-7159E6E3AC5D}"/>
+              </a:ext>
+            </a:extLst>
+          </p:cNvPr>
+          <p:cNvSpPr>
+            <a:spLocks noGrp="1"/>
+          </p:cNvSpPr>
+          <p:nvPr>
+            <p:ph type="title"/>
+          </p:nvPr>
+        </p:nvSpPr>
+        <p:spPr>
+          <a:xfrm>
+            <a:off x="373711" y="248891"/>
+            <a:ext cx="11444578" cy="859238"/>
+          </a:xfrm>
+        </p:spPr>
+        <p:txBody>
+          <a:bodyPr anchor="t">
+            <a:noAutofit/>
+          </a:bodyPr>
+          <a:lstStyle>
+            <a:lvl1pPr>
+              <a:defRPr sz="2800" b="1">
+                <a:solidFill>
+                  <a:schemeClr val="bg1"/>
+                </a:solidFill>
+                <a:latin typeface="Segoe UI Light" panose="020B0502040204020203" pitchFamily="34" charset="0"/>
+                <a:cs typeface="Segoe UI Light" panose="020B0502040204020203" pitchFamily="34" charset="0"/>
+              </a:defRPr>
+            </a:lvl1pPr>
+          </a:lstStyle>
+          <a:p>
+            <a:r>
+              <a:rPr lang="de-DE" dirty="0"/>
+              <a:t>Mastertitelformat bearbeiten</a:t>
+            </a:r>
+          </a:p>
+        </p:txBody>
+      </p:sp>
+      <p:sp>
+        <p:nvSpPr>
+          <p:cNvPr id="3" name="Content1">
+            <a:extLst>
+              <a:ext uri="{FF2B5EF4-FFF2-40B4-BE49-F238E27FC236}">
+                <a16:creationId xmlns:a16="http://schemas.microsoft.com/office/drawing/2014/main" id="{75533CEB-DBFF-06E5-8302-EBE4F9E15F08}"/>
+              </a:ext>
+            </a:extLst>
+          </p:cNvPr>
+          <p:cNvSpPr>
+            <a:spLocks noGrp="1"/>
+          </p:cNvSpPr>
+          <p:nvPr>
+            <p:ph idx="1"/>
+          </p:nvPr>
+        </p:nvSpPr>
+        <p:spPr>
+          <a:xfrm>
+            <a:off x="373711" y="1448873"/>
+            <a:ext cx="11444578" cy="5009353"/>
+          </a:xfrm>
+        </p:spPr>
+        <p:txBody>
+          <a:bodyPr>
+            <a:normAutofit/>
+          </a:bodyPr>
+          <a:lstStyle>
+            <a:lvl1pPr marL="0" indent="0">
+              <a:spcBef>
+                <a:spcPts val="400"/>
+              </a:spcBef>
+              <a:buNone/>
+              <a:defRPr sz="1400" b="1">
+                <a:latin typeface="Segoe UI Light" panose="020B0502040204020203" pitchFamily="34" charset="0"/>
+                <a:cs typeface="Segoe UI Light" panose="020B0502040204020203" pitchFamily="34" charset="0"/>
+              </a:defRPr>
+            </a:lvl1pPr>
+            <a:lvl2pPr marL="457200" indent="0">
+              <a:buNone/>
+              <a:defRPr sz="1200" b="1">
+                <a:latin typeface="Segoe UI Light" panose="020B0502040204020203" pitchFamily="34" charset="0"/>
+                <a:cs typeface="Segoe UI Light" panose="020B0502040204020203" pitchFamily="34" charset="0"/>
+              </a:defRPr>
+            </a:lvl2pPr>
+            <a:lvl3pPr marL="914400" indent="0">
+              <a:buNone/>
+              <a:defRPr sz="1100" b="1">
+                <a:latin typeface="Segoe UI Light" panose="020B0502040204020203" pitchFamily="34" charset="0"/>
+                <a:cs typeface="Segoe UI Light" panose="020B0502040204020203" pitchFamily="34" charset="0"/>
+              </a:defRPr>
+            </a:lvl3pPr>
+            <a:lvl4pPr marL="1371600" indent="0">
+              <a:buNone/>
+              <a:defRPr sz="1050" b="1">
+                <a:latin typeface="Segoe UI Light" panose="020B0502040204020203" pitchFamily="34" charset="0"/>
+                <a:cs typeface="Segoe UI Light" panose="020B0502040204020203" pitchFamily="34" charset="0"/>
+              </a:defRPr>
+            </a:lvl4pPr>
+            <a:lvl5pPr marL="1828800" indent="0">
+              <a:buNone/>
+              <a:defRPr sz="1050" b="1">
+                <a:latin typeface="Segoe UI Light" panose="020B0502040204020203" pitchFamily="34" charset="0"/>
+                <a:cs typeface="Segoe UI Light" panose="020B0502040204020203" pitchFamily="34" charset="0"/>
+              </a:defRPr>
+            </a:lvl5pPr>
+          </a:lstStyle>
+          <a:p>
+            <a:pPr lvl="0"/>
+            <a:r>
+              <a:rPr lang="de-DE" dirty="0"/>
+              <a:t>Mastertextformat bearbeiten</a:t>
+            </a:r>
+          </a:p>
+          <a:p>
+            <a:pPr lvl="1"/>
+            <a:r>
+              <a:rPr lang="de-DE" dirty="0"/>
+              <a:t>Zweite Ebene</a:t>
+            </a:r>
+          </a:p>
+          <a:p>
+            <a:pPr lvl="2"/>
+            <a:r>
+              <a:rPr lang="de-DE" dirty="0"/>
+              <a:t>Dritte Ebene</a:t>
+            </a:r>
+          </a:p>
+          <a:p>
+            <a:pPr lvl="3"/>
+            <a:r>
+              <a:rPr lang="de-DE" dirty="0"/>
+              <a:t>Vierte Ebene</a:t>
+            </a:r>
+          </a:p>
+          <a:p>
+            <a:pPr lvl="4"/>
+            <a:r>
+              <a:rPr lang="de-DE" dirty="0"/>
+              <a:t>Fünfte Ebene</a:t>
+            </a:r>
+          </a:p>
+        </p:txBody>
+      </p:sp>
+    </p:spTree>
+    <p:extLst>
+      <p:ext uri="{BB962C8B-B14F-4D97-AF65-F5344CB8AC3E}">
+        <p14:creationId xmlns:p14="http://schemas.microsoft.com/office/powerpoint/2010/main" val="1144778704"/>
       </p:ext>
     </p:extLst>
   </p:cSld>
@@ -642,7 +1646,7 @@
           <p:cNvPr id="2" name="Titelplatzhalter 1">
             <a:extLst>
               <a:ext uri="{FF2B5EF4-FFF2-40B4-BE49-F238E27FC236}">
-                <a16:creationId xmlns:a16="http://schemas.microsoft.com/office/drawing/2014/main" id="{43F06428-966E-AFBD-F502-26E59CDC39CD}"/>
+                <a16:creationId xmlns:a16="http://schemas.microsoft.com/office/drawing/2014/main" id="{75A58702-12A7-C01F-7D0E-B6A7838B7B22}"/>
               </a:ext>
             </a:extLst>
           </p:cNvPr>
@@ -680,7 +1684,7 @@
           <p:cNvPr id="3" name="Textplatzhalter 2">
             <a:extLst>
               <a:ext uri="{FF2B5EF4-FFF2-40B4-BE49-F238E27FC236}">
-                <a16:creationId xmlns:a16="http://schemas.microsoft.com/office/drawing/2014/main" id="{564CD669-E39E-2D96-9AB3-BC1F55F79419}"/>
+                <a16:creationId xmlns:a16="http://schemas.microsoft.com/office/drawing/2014/main" id="{EDBB0711-A751-33A2-E9E5-E222407A02D8}"/>
               </a:ext>
             </a:extLst>
           </p:cNvPr>
@@ -747,7 +1751,7 @@
           <p:cNvPr id="4" name="Datumsplatzhalter 3">
             <a:extLst>
               <a:ext uri="{FF2B5EF4-FFF2-40B4-BE49-F238E27FC236}">
-                <a16:creationId xmlns:a16="http://schemas.microsoft.com/office/drawing/2014/main" id="{56A6D220-48E4-887F-4420-6C538BFAEAEC}"/>
+                <a16:creationId xmlns:a16="http://schemas.microsoft.com/office/drawing/2014/main" id="{7203B7F0-7171-80C3-973D-39A5AC0AA280}"/>
               </a:ext>
             </a:extLst>
           </p:cNvPr>
@@ -781,9 +1785,9 @@
             </a:lvl1pPr>
           </a:lstStyle>
           <a:p>
-            <a:fld id="{EAEC61EB-ABD6-4FAE-AC4F-BD0C9A60D6B7}" type="datetimeFigureOut">
+            <a:fld id="{506867F6-8C78-486A-93BF-FCE4C882B7D7}" type="datetimeFigureOut">
               <a:rPr lang="de-DE" smtClean="0"/>
-              <a:t>16.12.2023</a:t>
+              <a:t>19.12.2023</a:t>
             </a:fld>
             <a:endParaRPr lang="de-DE"/>
           </a:p>
@@ -794,7 +1798,7 @@
           <p:cNvPr id="5" name="Fußzeilenplatzhalter 4">
             <a:extLst>
               <a:ext uri="{FF2B5EF4-FFF2-40B4-BE49-F238E27FC236}">
-                <a16:creationId xmlns:a16="http://schemas.microsoft.com/office/drawing/2014/main" id="{C896E759-839D-013D-5137-BA6D7D46D067}"/>
+                <a16:creationId xmlns:a16="http://schemas.microsoft.com/office/drawing/2014/main" id="{9D094DF6-0926-FC8B-9E65-528544317DD1}"/>
               </a:ext>
             </a:extLst>
           </p:cNvPr>
@@ -837,7 +1841,7 @@
           <p:cNvPr id="6" name="Foliennummernplatzhalter 5">
             <a:extLst>
               <a:ext uri="{FF2B5EF4-FFF2-40B4-BE49-F238E27FC236}">
-                <a16:creationId xmlns:a16="http://schemas.microsoft.com/office/drawing/2014/main" id="{1932E6B5-7AA3-3ED6-126A-3ED98322DAA6}"/>
+                <a16:creationId xmlns:a16="http://schemas.microsoft.com/office/drawing/2014/main" id="{92BF64A5-0A82-E43D-56BC-C9A62E2C13C3}"/>
               </a:ext>
             </a:extLst>
           </p:cNvPr>
@@ -871,7 +1875,7 @@
             </a:lvl1pPr>
           </a:lstStyle>
           <a:p>
-            <a:fld id="{0E34BF5D-22C2-44F7-9083-EA27BAEA1890}" type="slidenum">
+            <a:fld id="{76E15246-EC0C-4F3C-9509-064ABD34BB2E}" type="slidenum">
               <a:rPr lang="de-DE" smtClean="0"/>
               <a:t>‹Nr.›</a:t>
             </a:fld>
@@ -882,14 +1886,16 @@
     </p:spTree>
     <p:extLst>
       <p:ext uri="{BB962C8B-B14F-4D97-AF65-F5344CB8AC3E}">
-        <p14:creationId xmlns:p14="http://schemas.microsoft.com/office/powerpoint/2010/main" val="1091782548"/>
+        <p14:creationId xmlns:p14="http://schemas.microsoft.com/office/powerpoint/2010/main" val="948586268"/>
       </p:ext>
     </p:extLst>
   </p:cSld>
   <p:clrMap bg1="lt1" tx1="dk1" bg2="lt2" tx2="dk2" accent1="accent1" accent2="accent2" accent3="accent3" accent4="accent4" accent5="accent5" accent6="accent6" hlink="hlink" folHlink="folHlink"/>
   <p:sldLayoutIdLst>
-    <p:sldLayoutId id="2147483650" r:id="rId1"/>
-    <p:sldLayoutId id="2147483651" r:id="rId2"/>
+    <p:sldLayoutId id="2147483649" r:id="rId1"/>
+    <p:sldLayoutId id="2147483652" r:id="rId2"/>
+    <p:sldLayoutId id="2147483651" r:id="rId3"/>
+    <p:sldLayoutId id="2147483650" r:id="rId4"/>
   </p:sldLayoutIdLst>
   <p:txStyles>
     <p:titleStyle>
@@ -1196,7 +2202,7 @@
           <p:cNvPr id="2" name="Titel 1">
             <a:extLst>
               <a:ext uri="{FF2B5EF4-FFF2-40B4-BE49-F238E27FC236}">
-                <a16:creationId xmlns:a16="http://schemas.microsoft.com/office/drawing/2014/main" id="{AF865A3F-5A79-8350-698C-B7F0AE827E19}"/>
+                <a16:creationId xmlns:a16="http://schemas.microsoft.com/office/drawing/2014/main" id="{FEBA22C2-593D-7034-D837-B7F5E0095095}"/>
               </a:ext>
             </a:extLst>
           </p:cNvPr>
@@ -1204,7 +2210,7 @@
             <a:spLocks noGrp="1"/>
           </p:cNvSpPr>
           <p:nvPr>
-            <p:ph type="title"/>
+            <p:ph type="ctrTitle"/>
           </p:nvPr>
         </p:nvSpPr>
         <p:spPr/>
@@ -1213,42 +2219,36 @@
           <a:lstStyle/>
           <a:p>
             <a:r>
-              <a:rPr lang="en-US" dirty="0"/>
-              <a:t>1</a:t>
+              <a:rPr lang="en-US" dirty="0">
+                <a:latin typeface="Segoe UI Light" panose="020B0502040204020203" pitchFamily="34" charset="0"/>
+                <a:cs typeface="Segoe UI Light" panose="020B0502040204020203" pitchFamily="34" charset="0"/>
+              </a:rPr>
+              <a:t>Azure DevOps</a:t>
             </a:r>
-            <a:endParaRPr lang="de-DE" dirty="0"/>
-          </a:p>
-        </p:txBody>
-      </p:sp>
-      <p:sp>
-        <p:nvSpPr>
-          <p:cNvPr id="5" name="Inhaltsplatzhalter 4">
-            <a:extLst>
-              <a:ext uri="{FF2B5EF4-FFF2-40B4-BE49-F238E27FC236}">
-                <a16:creationId xmlns:a16="http://schemas.microsoft.com/office/drawing/2014/main" id="{5362DAA6-391E-941C-B08F-65ACA4AB08F0}"/>
-              </a:ext>
-            </a:extLst>
-          </p:cNvPr>
-          <p:cNvSpPr>
-            <a:spLocks noGrp="1"/>
-          </p:cNvSpPr>
-          <p:nvPr>
-            <p:ph idx="1"/>
-          </p:nvPr>
-        </p:nvSpPr>
-        <p:spPr/>
-        <p:txBody>
-          <a:bodyPr/>
-          <a:lstStyle/>
-          <a:p>
-            <a:endParaRPr lang="de-DE"/>
+            <a:br>
+              <a:rPr lang="en-US" dirty="0">
+                <a:latin typeface="Segoe UI Light" panose="020B0502040204020203" pitchFamily="34" charset="0"/>
+                <a:cs typeface="Segoe UI Light" panose="020B0502040204020203" pitchFamily="34" charset="0"/>
+              </a:rPr>
+            </a:br>
+            <a:r>
+              <a:rPr lang="en-US" dirty="0">
+                <a:latin typeface="Segoe UI Light" panose="020B0502040204020203" pitchFamily="34" charset="0"/>
+                <a:cs typeface="Segoe UI Light" panose="020B0502040204020203" pitchFamily="34" charset="0"/>
+              </a:rPr>
+              <a:t>Changes</a:t>
+            </a:r>
+            <a:endParaRPr lang="de-DE" dirty="0">
+              <a:latin typeface="Segoe UI Light" panose="020B0502040204020203" pitchFamily="34" charset="0"/>
+              <a:cs typeface="Segoe UI Light" panose="020B0502040204020203" pitchFamily="34" charset="0"/>
+            </a:endParaRPr>
           </a:p>
         </p:txBody>
       </p:sp>
     </p:spTree>
     <p:extLst>
       <p:ext uri="{BB962C8B-B14F-4D97-AF65-F5344CB8AC3E}">
-        <p14:creationId xmlns:p14="http://schemas.microsoft.com/office/powerpoint/2010/main" val="2549428160"/>
+        <p14:creationId xmlns:p14="http://schemas.microsoft.com/office/powerpoint/2010/main" val="3844676024"/>
       </p:ext>
     </p:extLst>
   </p:cSld>
@@ -1277,10 +2277,10 @@
       </p:grpSpPr>
       <p:sp>
         <p:nvSpPr>
-          <p:cNvPr id="2" name="Titel 1">
+          <p:cNvPr id="3" name="Titel 2">
             <a:extLst>
               <a:ext uri="{FF2B5EF4-FFF2-40B4-BE49-F238E27FC236}">
-                <a16:creationId xmlns:a16="http://schemas.microsoft.com/office/drawing/2014/main" id="{AF865A3F-5A79-8350-698C-B7F0AE827E19}"/>
+                <a16:creationId xmlns:a16="http://schemas.microsoft.com/office/drawing/2014/main" id="{EF91E15B-E551-EBBA-F22A-16757DB1E866}"/>
               </a:ext>
             </a:extLst>
           </p:cNvPr>
@@ -1298,245 +2298,22 @@
           <a:p>
             <a:r>
               <a:rPr lang="en-US" dirty="0"/>
-              <a:t>2</a:t>
+              <a:t>Detailed view of all changes</a:t>
             </a:r>
             <a:endParaRPr lang="de-DE" dirty="0"/>
-          </a:p>
-        </p:txBody>
-      </p:sp>
-      <p:sp>
-        <p:nvSpPr>
-          <p:cNvPr id="4" name="Inhaltsplatzhalter 3">
-            <a:extLst>
-              <a:ext uri="{FF2B5EF4-FFF2-40B4-BE49-F238E27FC236}">
-                <a16:creationId xmlns:a16="http://schemas.microsoft.com/office/drawing/2014/main" id="{A697850F-B915-3AC6-89B9-9F711DB8488C}"/>
-              </a:ext>
-            </a:extLst>
-          </p:cNvPr>
-          <p:cNvSpPr>
-            <a:spLocks noGrp="1"/>
-          </p:cNvSpPr>
-          <p:nvPr>
-            <p:ph idx="1"/>
-          </p:nvPr>
-        </p:nvSpPr>
-        <p:spPr/>
-        <p:txBody>
-          <a:bodyPr/>
-          <a:lstStyle/>
-          <a:p>
-            <a:endParaRPr lang="de-DE"/>
           </a:p>
         </p:txBody>
       </p:sp>
     </p:spTree>
     <p:extLst>
       <p:ext uri="{BB962C8B-B14F-4D97-AF65-F5344CB8AC3E}">
-        <p14:creationId xmlns:p14="http://schemas.microsoft.com/office/powerpoint/2010/main" val="2053789524"/>
+        <p14:creationId xmlns:p14="http://schemas.microsoft.com/office/powerpoint/2010/main" val="149701196"/>
       </p:ext>
     </p:extLst>
   </p:cSld>
   <p:clrMapOvr>
     <a:masterClrMapping/>
   </p:clrMapOvr>
-</p:sld>
-</file>
-
-<file path=ppt/slides/slide3.xml><?xml version="1.0" encoding="utf-8"?>
-<p:sld xmlns:a="http://schemas.openxmlformats.org/drawingml/2006/main" xmlns:r="http://schemas.openxmlformats.org/officeDocument/2006/relationships" xmlns:p="http://schemas.openxmlformats.org/presentationml/2006/main">
-  <p:cSld>
-    <p:spTree>
-      <p:nvGrpSpPr>
-        <p:cNvPr id="1" name=""/>
-        <p:cNvGrpSpPr/>
-        <p:nvPr/>
-      </p:nvGrpSpPr>
-      <p:grpSpPr>
-        <a:xfrm>
-          <a:off x="0" y="0"/>
-          <a:ext cx="0" cy="0"/>
-          <a:chOff x="0" y="0"/>
-          <a:chExt cx="0" cy="0"/>
-        </a:xfrm>
-      </p:grpSpPr>
-      <p:sp>
-        <p:nvSpPr>
-          <p:cNvPr id="2" name="Titel 1">
-            <a:extLst>
-              <a:ext uri="{FF2B5EF4-FFF2-40B4-BE49-F238E27FC236}">
-                <a16:creationId xmlns:a16="http://schemas.microsoft.com/office/drawing/2014/main" id="{AF865A3F-5A79-8350-698C-B7F0AE827E19}"/>
-              </a:ext>
-            </a:extLst>
-          </p:cNvPr>
-          <p:cNvSpPr>
-            <a:spLocks noGrp="1"/>
-          </p:cNvSpPr>
-          <p:nvPr>
-            <p:ph type="title"/>
-          </p:nvPr>
-        </p:nvSpPr>
-        <p:spPr/>
-        <p:txBody>
-          <a:bodyPr/>
-          <a:lstStyle/>
-          <a:p>
-            <a:r>
-              <a:rPr lang="en-US" dirty="0"/>
-              <a:t>3</a:t>
-            </a:r>
-            <a:endParaRPr lang="de-DE" dirty="0"/>
-          </a:p>
-        </p:txBody>
-      </p:sp>
-      <p:sp>
-        <p:nvSpPr>
-          <p:cNvPr id="4" name="Inhaltsplatzhalter 3">
-            <a:extLst>
-              <a:ext uri="{FF2B5EF4-FFF2-40B4-BE49-F238E27FC236}">
-                <a16:creationId xmlns:a16="http://schemas.microsoft.com/office/drawing/2014/main" id="{2FF84CDD-98EF-728E-F0A1-4C60B83EB13F}"/>
-              </a:ext>
-            </a:extLst>
-          </p:cNvPr>
-          <p:cNvSpPr>
-            <a:spLocks noGrp="1"/>
-          </p:cNvSpPr>
-          <p:nvPr>
-            <p:ph idx="1"/>
-          </p:nvPr>
-        </p:nvSpPr>
-        <p:spPr/>
-        <p:txBody>
-          <a:bodyPr/>
-          <a:lstStyle/>
-          <a:p>
-            <a:endParaRPr lang="de-DE"/>
-          </a:p>
-        </p:txBody>
-      </p:sp>
-    </p:spTree>
-    <p:extLst>
-      <p:ext uri="{BB962C8B-B14F-4D97-AF65-F5344CB8AC3E}">
-        <p14:creationId xmlns:p14="http://schemas.microsoft.com/office/powerpoint/2010/main" val="1900075344"/>
-      </p:ext>
-    </p:extLst>
-  </p:cSld>
-  <p:clrMapOvr>
-    <a:masterClrMapping/>
-  </p:clrMapOvr>
-</p:sld>
-</file>
-
-<file path=ppt/slides/slide4.xml><?xml version="1.0" encoding="utf-8"?>
-<p:sld xmlns:p="http://schemas.openxmlformats.org/presentationml/2006/main">
-  <p:cSld>
-    <p:spTree>
-      <p:nvGrpSpPr>
-        <p:cNvPr id="1" name=""/>
-        <p:cNvGrpSpPr/>
-        <p:nvPr/>
-      </p:nvGrpSpPr>
-      <p:grpSpPr/>
-      <p:sp>
-        <p:nvSpPr>
-          <p:cNvPr id="2" name="Title"/>
-          <p:cNvSpPr>
-            <a:spLocks xmlns:a="http://schemas.openxmlformats.org/drawingml/2006/main" noGrp="1"/>
-          </p:cNvSpPr>
-          <p:nvPr>
-            <p:ph type="title"/>
-          </p:nvPr>
-        </p:nvSpPr>
-        <p:spPr/>
-        <p:txBody>
-          <a:bodyPr xmlns:a="http://schemas.openxmlformats.org/drawingml/2006/main"/>
-          <a:lstStyle xmlns:a="http://schemas.openxmlformats.org/drawingml/2006/main"/>
-          <a:p xmlns:a="http://schemas.openxmlformats.org/drawingml/2006/main">
-            <a:r>
-              <a:t>Title Text</a:t>
-            </a:r>
-          </a:p>
-        </p:txBody>
-      </p:sp>
-      <p:sp>
-        <p:nvSpPr>
-          <p:cNvPr id="3" name="Content Placeholder"/>
-          <p:cNvSpPr>
-            <a:spLocks xmlns:a="http://schemas.openxmlformats.org/drawingml/2006/main" noGrp="1"/>
-          </p:cNvSpPr>
-          <p:nvPr>
-            <p:ph idx="14"/>
-          </p:nvPr>
-        </p:nvSpPr>
-        <p:spPr/>
-        <p:txBody>
-          <a:bodyPr xmlns:a="http://schemas.openxmlformats.org/drawingml/2006/main"/>
-          <a:lstStyle xmlns:a="http://schemas.openxmlformats.org/drawingml/2006/main"/>
-          <a:p xmlns:a="http://schemas.openxmlformats.org/drawingml/2006/main">
-            <a:r>
-              <a:t>XXX Text XXX</a:t>
-            </a:r>
-          </a:p>
-        </p:txBody>
-      </p:sp>
-    </p:spTree>
-  </p:cSld>
-</p:sld>
-</file>
-
-<file path=ppt/slides/slide5.xml><?xml version="1.0" encoding="utf-8"?>
-<p:sld xmlns:p="http://schemas.openxmlformats.org/presentationml/2006/main">
-  <p:cSld>
-    <p:spTree>
-      <p:nvGrpSpPr>
-        <p:cNvPr id="1" name=""/>
-        <p:cNvGrpSpPr/>
-        <p:nvPr/>
-      </p:nvGrpSpPr>
-      <p:grpSpPr/>
-      <p:sp>
-        <p:nvSpPr>
-          <p:cNvPr id="2" name="Title"/>
-          <p:cNvSpPr>
-            <a:spLocks xmlns:a="http://schemas.openxmlformats.org/drawingml/2006/main" noGrp="1"/>
-          </p:cNvSpPr>
-          <p:nvPr>
-            <p:ph type="title"/>
-          </p:nvPr>
-        </p:nvSpPr>
-        <p:spPr/>
-        <p:txBody>
-          <a:bodyPr xmlns:a="http://schemas.openxmlformats.org/drawingml/2006/main"/>
-          <a:lstStyle xmlns:a="http://schemas.openxmlformats.org/drawingml/2006/main"/>
-          <a:p xmlns:a="http://schemas.openxmlformats.org/drawingml/2006/main">
-            <a:r>
-              <a:t>Title Text</a:t>
-            </a:r>
-          </a:p>
-        </p:txBody>
-      </p:sp>
-      <p:sp>
-        <p:nvSpPr>
-          <p:cNvPr id="3" name="Content Placeholder"/>
-          <p:cNvSpPr>
-            <a:spLocks xmlns:a="http://schemas.openxmlformats.org/drawingml/2006/main" noGrp="1"/>
-          </p:cNvSpPr>
-          <p:nvPr>
-            <p:ph idx="14"/>
-          </p:nvPr>
-        </p:nvSpPr>
-        <p:spPr/>
-        <p:txBody>
-          <a:bodyPr xmlns:a="http://schemas.openxmlformats.org/drawingml/2006/main"/>
-          <a:lstStyle xmlns:a="http://schemas.openxmlformats.org/drawingml/2006/main"/>
-          <a:p xmlns:a="http://schemas.openxmlformats.org/drawingml/2006/main">
-            <a:r>
-              <a:t>XXX Text XXX</a:t>
-            </a:r>
-          </a:p>
-        </p:txBody>
-      </p:sp>
-    </p:spTree>
-  </p:cSld>
 </p:sld>
 </file>
 
@@ -1853,4 +2630,10 @@
     </a:ext>
   </a:extLst>
 </a:theme>
+</file>
+
+<file path=docMetadata/LabelInfo.xml><?xml version="1.0" encoding="utf-8"?>
+<clbl:labelList xmlns:clbl="http://schemas.microsoft.com/office/2020/mipLabelMetadata">
+  <clbl:label id="{f42aa342-8706-4288-bd11-ebb85995028c}" enabled="1" method="Standard" siteId="{72f988bf-86f1-41af-91ab-2d7cd011db47}" contentBits="0" removed="0"/>
+</clbl:labelList>
 </file>
</xml_diff>

<commit_message>
InsertNewSlide renamed to InsertNewSlideWithText. Function can now handle array as content parameter.
</commit_message>
<xml_diff>
--- a/ChangeQueryExport/Plugins/PPTXExportPlugin_Template.pptx
+++ b/ChangeQueryExport/Plugins/PPTXExportPlugin_Template.pptx
@@ -1068,51 +1068,6 @@
       </p:sp>
       <p:sp>
         <p:nvSpPr>
-          <p:cNvPr id="6" name="Header1">
-            <a:extLst>
-              <a:ext uri="{FF2B5EF4-FFF2-40B4-BE49-F238E27FC236}">
-                <a16:creationId xmlns:a16="http://schemas.microsoft.com/office/drawing/2014/main" id="{1D3C6702-E79A-67C6-F826-2BCC0F98A173}"/>
-              </a:ext>
-            </a:extLst>
-          </p:cNvPr>
-          <p:cNvSpPr txBox="1"/>
-          <p:nvPr userDrawn="1"/>
-        </p:nvSpPr>
-        <p:spPr>
-          <a:xfrm>
-            <a:off x="993913" y="1993126"/>
-            <a:ext cx="1371600" cy="369332"/>
-          </a:xfrm>
-          <a:prstGeom prst="rect">
-            <a:avLst/>
-          </a:prstGeom>
-          <a:noFill/>
-        </p:spPr>
-        <p:txBody>
-          <a:bodyPr wrap="square" rtlCol="0">
-            <a:spAutoFit/>
-          </a:bodyPr>
-          <a:lstStyle/>
-          <a:p>
-            <a:pPr algn="ctr"/>
-            <a:r>
-              <a:rPr lang="en-US" dirty="0">
-                <a:solidFill>
-                  <a:schemeClr val="bg1"/>
-                </a:solidFill>
-              </a:rPr>
-              <a:t>Changes</a:t>
-            </a:r>
-            <a:endParaRPr lang="de-DE" dirty="0">
-              <a:solidFill>
-                <a:schemeClr val="bg1"/>
-              </a:solidFill>
-            </a:endParaRPr>
-          </a:p>
-        </p:txBody>
-      </p:sp>
-      <p:sp>
-        <p:nvSpPr>
           <p:cNvPr id="3" name="Content1">
             <a:extLst>
               <a:ext uri="{FF2B5EF4-FFF2-40B4-BE49-F238E27FC236}">
@@ -1312,6 +1267,81 @@
           <a:xfrm>
             <a:off x="2562989" y="2362458"/>
             <a:ext cx="1371600" cy="1002268"/>
+          </a:xfrm>
+        </p:spPr>
+        <p:txBody>
+          <a:bodyPr anchor="ctr">
+            <a:noAutofit/>
+          </a:bodyPr>
+          <a:lstStyle>
+            <a:lvl1pPr marL="0" indent="0" algn="ctr">
+              <a:spcBef>
+                <a:spcPts val="400"/>
+              </a:spcBef>
+              <a:buNone/>
+              <a:defRPr sz="2800" b="1">
+                <a:solidFill>
+                  <a:schemeClr val="bg1"/>
+                </a:solidFill>
+                <a:latin typeface="Segoe UI Light" panose="020B0502040204020203" pitchFamily="34" charset="0"/>
+                <a:cs typeface="Segoe UI Light" panose="020B0502040204020203" pitchFamily="34" charset="0"/>
+              </a:defRPr>
+            </a:lvl1pPr>
+            <a:lvl2pPr marL="457200" indent="0" algn="ctr">
+              <a:buNone/>
+              <a:defRPr sz="2800" b="1">
+                <a:latin typeface="Segoe UI Light" panose="020B0502040204020203" pitchFamily="34" charset="0"/>
+                <a:cs typeface="Segoe UI Light" panose="020B0502040204020203" pitchFamily="34" charset="0"/>
+              </a:defRPr>
+            </a:lvl2pPr>
+            <a:lvl3pPr marL="914400" indent="0" algn="ctr">
+              <a:buNone/>
+              <a:defRPr sz="2800" b="1">
+                <a:latin typeface="Segoe UI Light" panose="020B0502040204020203" pitchFamily="34" charset="0"/>
+                <a:cs typeface="Segoe UI Light" panose="020B0502040204020203" pitchFamily="34" charset="0"/>
+              </a:defRPr>
+            </a:lvl3pPr>
+            <a:lvl4pPr marL="1371600" indent="0" algn="ctr">
+              <a:buNone/>
+              <a:defRPr sz="2800" b="1">
+                <a:latin typeface="Segoe UI Light" panose="020B0502040204020203" pitchFamily="34" charset="0"/>
+                <a:cs typeface="Segoe UI Light" panose="020B0502040204020203" pitchFamily="34" charset="0"/>
+              </a:defRPr>
+            </a:lvl4pPr>
+            <a:lvl5pPr marL="1828800" indent="0" algn="ctr">
+              <a:buNone/>
+              <a:defRPr sz="2800" b="1">
+                <a:latin typeface="Segoe UI Light" panose="020B0502040204020203" pitchFamily="34" charset="0"/>
+                <a:cs typeface="Segoe UI Light" panose="020B0502040204020203" pitchFamily="34" charset="0"/>
+              </a:defRPr>
+            </a:lvl5pPr>
+          </a:lstStyle>
+          <a:p>
+            <a:pPr lvl="0"/>
+            <a:endParaRPr lang="de-DE" dirty="0"/>
+          </a:p>
+        </p:txBody>
+      </p:sp>
+      <p:sp>
+        <p:nvSpPr>
+          <p:cNvPr id="10" name="Header1">
+            <a:extLst>
+              <a:ext uri="{FF2B5EF4-FFF2-40B4-BE49-F238E27FC236}">
+                <a16:creationId xmlns:a16="http://schemas.microsoft.com/office/drawing/2014/main" id="{DE4AE299-49F6-B334-2BE3-233B20A7B0FF}"/>
+              </a:ext>
+            </a:extLst>
+          </p:cNvPr>
+          <p:cNvSpPr>
+            <a:spLocks noGrp="1"/>
+          </p:cNvSpPr>
+          <p:nvPr>
+            <p:ph idx="11"/>
+          </p:nvPr>
+        </p:nvSpPr>
+        <p:spPr>
+          <a:xfrm>
+            <a:off x="993913" y="1993126"/>
+            <a:ext cx="1371600" cy="369332"/>
           </a:xfrm>
         </p:spPr>
         <p:txBody>

</xml_diff>